<commit_message>
add STL CAD models of ASH
</commit_message>
<xml_diff>
--- a/Docs/Models/SAFFiR_Model/ASH_Webots_Layout.pptx
+++ b/Docs/Models/SAFFiR_Model/ASH_Webots_Layout.pptx
@@ -7,6 +7,9 @@
   <p:sldIdLst>
     <p:sldId id="256" r:id="rId2"/>
     <p:sldId id="257" r:id="rId3"/>
+    <p:sldId id="258" r:id="rId4"/>
+    <p:sldId id="259" r:id="rId5"/>
+    <p:sldId id="260" r:id="rId6"/>
   </p:sldIdLst>
   <p:sldSz cx="12192000" cy="6858000"/>
   <p:notesSz cx="6858000" cy="9144000"/>
@@ -244,7 +247,7 @@
           <a:p>
             <a:fld id="{2C9A94A1-1001-4065-8966-01CC5CBAFDFD}" type="datetimeFigureOut">
               <a:rPr lang="en-US" smtClean="0"/>
-              <a:t>1/22/2013</a:t>
+              <a:t>2/5/2013</a:t>
             </a:fld>
             <a:endParaRPr lang="en-US"/>
           </a:p>
@@ -414,7 +417,7 @@
           <a:p>
             <a:fld id="{2C9A94A1-1001-4065-8966-01CC5CBAFDFD}" type="datetimeFigureOut">
               <a:rPr lang="en-US" smtClean="0"/>
-              <a:t>1/22/2013</a:t>
+              <a:t>2/5/2013</a:t>
             </a:fld>
             <a:endParaRPr lang="en-US"/>
           </a:p>
@@ -594,7 +597,7 @@
           <a:p>
             <a:fld id="{2C9A94A1-1001-4065-8966-01CC5CBAFDFD}" type="datetimeFigureOut">
               <a:rPr lang="en-US" smtClean="0"/>
-              <a:t>1/22/2013</a:t>
+              <a:t>2/5/2013</a:t>
             </a:fld>
             <a:endParaRPr lang="en-US"/>
           </a:p>
@@ -764,7 +767,7 @@
           <a:p>
             <a:fld id="{2C9A94A1-1001-4065-8966-01CC5CBAFDFD}" type="datetimeFigureOut">
               <a:rPr lang="en-US" smtClean="0"/>
-              <a:t>1/22/2013</a:t>
+              <a:t>2/5/2013</a:t>
             </a:fld>
             <a:endParaRPr lang="en-US"/>
           </a:p>
@@ -956,7 +959,7 @@
           <a:p>
             <a:fld id="{2C9A94A1-1001-4065-8966-01CC5CBAFDFD}" type="datetimeFigureOut">
               <a:rPr lang="en-US" smtClean="0"/>
-              <a:t>1/22/2013</a:t>
+              <a:t>2/5/2013</a:t>
             </a:fld>
             <a:endParaRPr lang="en-US"/>
           </a:p>
@@ -1244,7 +1247,7 @@
           <a:p>
             <a:fld id="{2C9A94A1-1001-4065-8966-01CC5CBAFDFD}" type="datetimeFigureOut">
               <a:rPr lang="en-US" smtClean="0"/>
-              <a:t>1/22/2013</a:t>
+              <a:t>2/5/2013</a:t>
             </a:fld>
             <a:endParaRPr lang="en-US"/>
           </a:p>
@@ -1667,7 +1670,7 @@
           <a:p>
             <a:fld id="{2C9A94A1-1001-4065-8966-01CC5CBAFDFD}" type="datetimeFigureOut">
               <a:rPr lang="en-US" smtClean="0"/>
-              <a:t>1/22/2013</a:t>
+              <a:t>2/5/2013</a:t>
             </a:fld>
             <a:endParaRPr lang="en-US"/>
           </a:p>
@@ -1785,7 +1788,7 @@
           <a:p>
             <a:fld id="{2C9A94A1-1001-4065-8966-01CC5CBAFDFD}" type="datetimeFigureOut">
               <a:rPr lang="en-US" smtClean="0"/>
-              <a:t>1/22/2013</a:t>
+              <a:t>2/5/2013</a:t>
             </a:fld>
             <a:endParaRPr lang="en-US"/>
           </a:p>
@@ -1880,7 +1883,7 @@
           <a:p>
             <a:fld id="{2C9A94A1-1001-4065-8966-01CC5CBAFDFD}" type="datetimeFigureOut">
               <a:rPr lang="en-US" smtClean="0"/>
-              <a:t>1/22/2013</a:t>
+              <a:t>2/5/2013</a:t>
             </a:fld>
             <a:endParaRPr lang="en-US"/>
           </a:p>
@@ -2157,7 +2160,7 @@
           <a:p>
             <a:fld id="{2C9A94A1-1001-4065-8966-01CC5CBAFDFD}" type="datetimeFigureOut">
               <a:rPr lang="en-US" smtClean="0"/>
-              <a:t>1/22/2013</a:t>
+              <a:t>2/5/2013</a:t>
             </a:fld>
             <a:endParaRPr lang="en-US"/>
           </a:p>
@@ -2410,7 +2413,7 @@
           <a:p>
             <a:fld id="{2C9A94A1-1001-4065-8966-01CC5CBAFDFD}" type="datetimeFigureOut">
               <a:rPr lang="en-US" smtClean="0"/>
-              <a:t>1/22/2013</a:t>
+              <a:t>2/5/2013</a:t>
             </a:fld>
             <a:endParaRPr lang="en-US"/>
           </a:p>
@@ -2623,7 +2626,7 @@
           <a:p>
             <a:fld id="{2C9A94A1-1001-4065-8966-01CC5CBAFDFD}" type="datetimeFigureOut">
               <a:rPr lang="en-US" smtClean="0"/>
-              <a:t>1/22/2013</a:t>
+              <a:t>2/5/2013</a:t>
             </a:fld>
             <a:endParaRPr lang="en-US"/>
           </a:p>
@@ -5958,6 +5961,4171 @@
 </p:sld>
 </file>
 
+<file path=ppt/slides/slide3.xml><?xml version="1.0" encoding="utf-8"?>
+<p:sld xmlns:a="http://schemas.openxmlformats.org/drawingml/2006/main" xmlns:r="http://schemas.openxmlformats.org/officeDocument/2006/relationships" xmlns:p="http://schemas.openxmlformats.org/presentationml/2006/main">
+  <p:cSld>
+    <p:spTree>
+      <p:nvGrpSpPr>
+        <p:cNvPr id="1" name=""/>
+        <p:cNvGrpSpPr/>
+        <p:nvPr/>
+      </p:nvGrpSpPr>
+      <p:grpSpPr>
+        <a:xfrm>
+          <a:off x="0" y="0"/>
+          <a:ext cx="0" cy="0"/>
+          <a:chOff x="0" y="0"/>
+          <a:chExt cx="0" cy="0"/>
+        </a:xfrm>
+      </p:grpSpPr>
+      <p:grpSp>
+        <p:nvGrpSpPr>
+          <p:cNvPr id="80" name="Group 79"/>
+          <p:cNvGrpSpPr/>
+          <p:nvPr/>
+        </p:nvGrpSpPr>
+        <p:grpSpPr>
+          <a:xfrm>
+            <a:off x="3561875" y="0"/>
+            <a:ext cx="5144120" cy="6858000"/>
+            <a:chOff x="3823179" y="0"/>
+            <a:chExt cx="5144120" cy="6858000"/>
+          </a:xfrm>
+        </p:grpSpPr>
+        <p:pic>
+          <p:nvPicPr>
+            <p:cNvPr id="4" name="Picture 3"/>
+            <p:cNvPicPr>
+              <a:picLocks noChangeAspect="1"/>
+            </p:cNvPicPr>
+            <p:nvPr/>
+          </p:nvPicPr>
+          <p:blipFill>
+            <a:blip r:embed="rId2" cstate="print">
+              <a:extLst>
+                <a:ext uri="{28A0092B-C50C-407E-A947-70E740481C1C}">
+                  <a14:useLocalDpi xmlns:a14="http://schemas.microsoft.com/office/drawing/2010/main" val="0"/>
+                </a:ext>
+              </a:extLst>
+            </a:blip>
+            <a:stretch>
+              <a:fillRect/>
+            </a:stretch>
+          </p:blipFill>
+          <p:spPr>
+            <a:xfrm>
+              <a:off x="3823179" y="0"/>
+              <a:ext cx="4545641" cy="6858000"/>
+            </a:xfrm>
+            <a:prstGeom prst="rect">
+              <a:avLst/>
+            </a:prstGeom>
+          </p:spPr>
+        </p:pic>
+        <p:sp>
+          <p:nvSpPr>
+            <p:cNvPr id="5" name="Rectangle 4"/>
+            <p:cNvSpPr/>
+            <p:nvPr/>
+          </p:nvSpPr>
+          <p:spPr>
+            <a:xfrm>
+              <a:off x="6178378" y="428368"/>
+              <a:ext cx="642552" cy="551935"/>
+            </a:xfrm>
+            <a:prstGeom prst="rect">
+              <a:avLst/>
+            </a:prstGeom>
+            <a:noFill/>
+            <a:ln w="28575">
+              <a:solidFill>
+                <a:srgbClr val="FF0000"/>
+              </a:solidFill>
+            </a:ln>
+          </p:spPr>
+          <p:style>
+            <a:lnRef idx="2">
+              <a:schemeClr val="accent1">
+                <a:shade val="50000"/>
+              </a:schemeClr>
+            </a:lnRef>
+            <a:fillRef idx="1">
+              <a:schemeClr val="accent1"/>
+            </a:fillRef>
+            <a:effectRef idx="0">
+              <a:schemeClr val="accent1"/>
+            </a:effectRef>
+            <a:fontRef idx="minor">
+              <a:schemeClr val="lt1"/>
+            </a:fontRef>
+          </p:style>
+          <p:txBody>
+            <a:bodyPr rtlCol="0" anchor="ctr"/>
+            <a:lstStyle/>
+            <a:p>
+              <a:pPr algn="ctr"/>
+              <a:endParaRPr lang="en-US"/>
+            </a:p>
+          </p:txBody>
+        </p:sp>
+        <p:sp>
+          <p:nvSpPr>
+            <p:cNvPr id="6" name="Rectangle 5"/>
+            <p:cNvSpPr/>
+            <p:nvPr/>
+          </p:nvSpPr>
+          <p:spPr>
+            <a:xfrm>
+              <a:off x="6367849" y="980302"/>
+              <a:ext cx="230659" cy="238897"/>
+            </a:xfrm>
+            <a:prstGeom prst="rect">
+              <a:avLst/>
+            </a:prstGeom>
+            <a:noFill/>
+            <a:ln w="28575">
+              <a:solidFill>
+                <a:srgbClr val="FF0000"/>
+              </a:solidFill>
+            </a:ln>
+          </p:spPr>
+          <p:style>
+            <a:lnRef idx="2">
+              <a:schemeClr val="accent1">
+                <a:shade val="50000"/>
+              </a:schemeClr>
+            </a:lnRef>
+            <a:fillRef idx="1">
+              <a:schemeClr val="accent1"/>
+            </a:fillRef>
+            <a:effectRef idx="0">
+              <a:schemeClr val="accent1"/>
+            </a:effectRef>
+            <a:fontRef idx="minor">
+              <a:schemeClr val="lt1"/>
+            </a:fontRef>
+          </p:style>
+          <p:txBody>
+            <a:bodyPr rtlCol="0" anchor="ctr"/>
+            <a:lstStyle/>
+            <a:p>
+              <a:pPr algn="ctr"/>
+              <a:endParaRPr lang="en-US"/>
+            </a:p>
+          </p:txBody>
+        </p:sp>
+        <p:sp>
+          <p:nvSpPr>
+            <p:cNvPr id="7" name="Rectangle 6"/>
+            <p:cNvSpPr/>
+            <p:nvPr/>
+          </p:nvSpPr>
+          <p:spPr>
+            <a:xfrm>
+              <a:off x="5955955" y="1219199"/>
+              <a:ext cx="980303" cy="700217"/>
+            </a:xfrm>
+            <a:prstGeom prst="rect">
+              <a:avLst/>
+            </a:prstGeom>
+            <a:noFill/>
+            <a:ln w="28575">
+              <a:solidFill>
+                <a:srgbClr val="FF0000"/>
+              </a:solidFill>
+            </a:ln>
+          </p:spPr>
+          <p:style>
+            <a:lnRef idx="2">
+              <a:schemeClr val="accent1">
+                <a:shade val="50000"/>
+              </a:schemeClr>
+            </a:lnRef>
+            <a:fillRef idx="1">
+              <a:schemeClr val="accent1"/>
+            </a:fillRef>
+            <a:effectRef idx="0">
+              <a:schemeClr val="accent1"/>
+            </a:effectRef>
+            <a:fontRef idx="minor">
+              <a:schemeClr val="lt1"/>
+            </a:fontRef>
+          </p:style>
+          <p:txBody>
+            <a:bodyPr rtlCol="0" anchor="ctr"/>
+            <a:lstStyle/>
+            <a:p>
+              <a:pPr algn="ctr"/>
+              <a:endParaRPr lang="en-US"/>
+            </a:p>
+          </p:txBody>
+        </p:sp>
+        <p:sp>
+          <p:nvSpPr>
+            <p:cNvPr id="8" name="Rectangle 7"/>
+            <p:cNvSpPr/>
+            <p:nvPr/>
+          </p:nvSpPr>
+          <p:spPr>
+            <a:xfrm>
+              <a:off x="6046573" y="2034746"/>
+              <a:ext cx="889685" cy="1301578"/>
+            </a:xfrm>
+            <a:prstGeom prst="rect">
+              <a:avLst/>
+            </a:prstGeom>
+            <a:noFill/>
+            <a:ln w="28575">
+              <a:solidFill>
+                <a:srgbClr val="FF0000"/>
+              </a:solidFill>
+            </a:ln>
+          </p:spPr>
+          <p:style>
+            <a:lnRef idx="2">
+              <a:schemeClr val="accent1">
+                <a:shade val="50000"/>
+              </a:schemeClr>
+            </a:lnRef>
+            <a:fillRef idx="1">
+              <a:schemeClr val="accent1"/>
+            </a:fillRef>
+            <a:effectRef idx="0">
+              <a:schemeClr val="accent1"/>
+            </a:effectRef>
+            <a:fontRef idx="minor">
+              <a:schemeClr val="lt1"/>
+            </a:fontRef>
+          </p:style>
+          <p:txBody>
+            <a:bodyPr rtlCol="0" anchor="ctr"/>
+            <a:lstStyle/>
+            <a:p>
+              <a:pPr algn="ctr"/>
+              <a:endParaRPr lang="en-US"/>
+            </a:p>
+          </p:txBody>
+        </p:sp>
+        <p:sp>
+          <p:nvSpPr>
+            <p:cNvPr id="9" name="Rectangle 8"/>
+            <p:cNvSpPr/>
+            <p:nvPr/>
+          </p:nvSpPr>
+          <p:spPr>
+            <a:xfrm>
+              <a:off x="6993925" y="1219199"/>
+              <a:ext cx="469556" cy="448960"/>
+            </a:xfrm>
+            <a:prstGeom prst="rect">
+              <a:avLst/>
+            </a:prstGeom>
+            <a:noFill/>
+            <a:ln w="28575">
+              <a:solidFill>
+                <a:srgbClr val="FF0000"/>
+              </a:solidFill>
+            </a:ln>
+          </p:spPr>
+          <p:style>
+            <a:lnRef idx="2">
+              <a:schemeClr val="accent1">
+                <a:shade val="50000"/>
+              </a:schemeClr>
+            </a:lnRef>
+            <a:fillRef idx="1">
+              <a:schemeClr val="accent1"/>
+            </a:fillRef>
+            <a:effectRef idx="0">
+              <a:schemeClr val="accent1"/>
+            </a:effectRef>
+            <a:fontRef idx="minor">
+              <a:schemeClr val="lt1"/>
+            </a:fontRef>
+          </p:style>
+          <p:txBody>
+            <a:bodyPr rtlCol="0" anchor="ctr"/>
+            <a:lstStyle/>
+            <a:p>
+              <a:pPr algn="ctr"/>
+              <a:endParaRPr lang="en-US"/>
+            </a:p>
+          </p:txBody>
+        </p:sp>
+        <p:sp>
+          <p:nvSpPr>
+            <p:cNvPr id="10" name="Rectangle 9"/>
+            <p:cNvSpPr/>
+            <p:nvPr/>
+          </p:nvSpPr>
+          <p:spPr>
+            <a:xfrm>
+              <a:off x="7142205" y="1758778"/>
+              <a:ext cx="428368" cy="910281"/>
+            </a:xfrm>
+            <a:prstGeom prst="rect">
+              <a:avLst/>
+            </a:prstGeom>
+            <a:noFill/>
+            <a:ln w="28575">
+              <a:solidFill>
+                <a:srgbClr val="FF0000"/>
+              </a:solidFill>
+            </a:ln>
+          </p:spPr>
+          <p:style>
+            <a:lnRef idx="2">
+              <a:schemeClr val="accent1">
+                <a:shade val="50000"/>
+              </a:schemeClr>
+            </a:lnRef>
+            <a:fillRef idx="1">
+              <a:schemeClr val="accent1"/>
+            </a:fillRef>
+            <a:effectRef idx="0">
+              <a:schemeClr val="accent1"/>
+            </a:effectRef>
+            <a:fontRef idx="minor">
+              <a:schemeClr val="lt1"/>
+            </a:fontRef>
+          </p:style>
+          <p:txBody>
+            <a:bodyPr rtlCol="0" anchor="ctr"/>
+            <a:lstStyle/>
+            <a:p>
+              <a:pPr algn="ctr"/>
+              <a:endParaRPr lang="en-US"/>
+            </a:p>
+          </p:txBody>
+        </p:sp>
+        <p:sp>
+          <p:nvSpPr>
+            <p:cNvPr id="11" name="Rectangle 10"/>
+            <p:cNvSpPr/>
+            <p:nvPr/>
+          </p:nvSpPr>
+          <p:spPr>
+            <a:xfrm>
+              <a:off x="7142205" y="2702009"/>
+              <a:ext cx="428368" cy="551935"/>
+            </a:xfrm>
+            <a:prstGeom prst="rect">
+              <a:avLst/>
+            </a:prstGeom>
+            <a:noFill/>
+            <a:ln w="28575">
+              <a:solidFill>
+                <a:srgbClr val="FF0000"/>
+              </a:solidFill>
+            </a:ln>
+          </p:spPr>
+          <p:style>
+            <a:lnRef idx="2">
+              <a:schemeClr val="accent1">
+                <a:shade val="50000"/>
+              </a:schemeClr>
+            </a:lnRef>
+            <a:fillRef idx="1">
+              <a:schemeClr val="accent1"/>
+            </a:fillRef>
+            <a:effectRef idx="0">
+              <a:schemeClr val="accent1"/>
+            </a:effectRef>
+            <a:fontRef idx="minor">
+              <a:schemeClr val="lt1"/>
+            </a:fontRef>
+          </p:style>
+          <p:txBody>
+            <a:bodyPr rtlCol="0" anchor="ctr"/>
+            <a:lstStyle/>
+            <a:p>
+              <a:pPr algn="ctr"/>
+              <a:endParaRPr lang="en-US"/>
+            </a:p>
+          </p:txBody>
+        </p:sp>
+        <p:sp>
+          <p:nvSpPr>
+            <p:cNvPr id="12" name="Rectangle 11"/>
+            <p:cNvSpPr/>
+            <p:nvPr/>
+          </p:nvSpPr>
+          <p:spPr>
+            <a:xfrm>
+              <a:off x="7035114" y="3317781"/>
+              <a:ext cx="428367" cy="205949"/>
+            </a:xfrm>
+            <a:prstGeom prst="rect">
+              <a:avLst/>
+            </a:prstGeom>
+            <a:noFill/>
+            <a:ln w="28575">
+              <a:solidFill>
+                <a:srgbClr val="FF0000"/>
+              </a:solidFill>
+            </a:ln>
+          </p:spPr>
+          <p:style>
+            <a:lnRef idx="2">
+              <a:schemeClr val="accent1">
+                <a:shade val="50000"/>
+              </a:schemeClr>
+            </a:lnRef>
+            <a:fillRef idx="1">
+              <a:schemeClr val="accent1"/>
+            </a:fillRef>
+            <a:effectRef idx="0">
+              <a:schemeClr val="accent1"/>
+            </a:effectRef>
+            <a:fontRef idx="minor">
+              <a:schemeClr val="lt1"/>
+            </a:fontRef>
+          </p:style>
+          <p:txBody>
+            <a:bodyPr rtlCol="0" anchor="ctr"/>
+            <a:lstStyle/>
+            <a:p>
+              <a:pPr algn="ctr"/>
+              <a:endParaRPr lang="en-US"/>
+            </a:p>
+          </p:txBody>
+        </p:sp>
+        <p:sp>
+          <p:nvSpPr>
+            <p:cNvPr id="13" name="Rectangle 12"/>
+            <p:cNvSpPr/>
+            <p:nvPr/>
+          </p:nvSpPr>
+          <p:spPr>
+            <a:xfrm>
+              <a:off x="6829168" y="3552567"/>
+              <a:ext cx="568410" cy="525164"/>
+            </a:xfrm>
+            <a:prstGeom prst="rect">
+              <a:avLst/>
+            </a:prstGeom>
+            <a:noFill/>
+            <a:ln w="28575">
+              <a:solidFill>
+                <a:srgbClr val="FF0000"/>
+              </a:solidFill>
+            </a:ln>
+          </p:spPr>
+          <p:style>
+            <a:lnRef idx="2">
+              <a:schemeClr val="accent1">
+                <a:shade val="50000"/>
+              </a:schemeClr>
+            </a:lnRef>
+            <a:fillRef idx="1">
+              <a:schemeClr val="accent1"/>
+            </a:fillRef>
+            <a:effectRef idx="0">
+              <a:schemeClr val="accent1"/>
+            </a:effectRef>
+            <a:fontRef idx="minor">
+              <a:schemeClr val="lt1"/>
+            </a:fontRef>
+          </p:style>
+          <p:txBody>
+            <a:bodyPr rtlCol="0" anchor="ctr"/>
+            <a:lstStyle/>
+            <a:p>
+              <a:pPr algn="ctr"/>
+              <a:endParaRPr lang="en-US"/>
+            </a:p>
+          </p:txBody>
+        </p:sp>
+        <p:sp>
+          <p:nvSpPr>
+            <p:cNvPr id="14" name="Rectangle 13"/>
+            <p:cNvSpPr/>
+            <p:nvPr/>
+          </p:nvSpPr>
+          <p:spPr>
+            <a:xfrm rot="1207510">
+              <a:off x="5652681" y="3365472"/>
+              <a:ext cx="507450" cy="1297459"/>
+            </a:xfrm>
+            <a:prstGeom prst="rect">
+              <a:avLst/>
+            </a:prstGeom>
+            <a:noFill/>
+            <a:ln w="28575">
+              <a:solidFill>
+                <a:srgbClr val="FF0000"/>
+              </a:solidFill>
+            </a:ln>
+          </p:spPr>
+          <p:style>
+            <a:lnRef idx="2">
+              <a:schemeClr val="accent1">
+                <a:shade val="50000"/>
+              </a:schemeClr>
+            </a:lnRef>
+            <a:fillRef idx="1">
+              <a:schemeClr val="accent1"/>
+            </a:fillRef>
+            <a:effectRef idx="0">
+              <a:schemeClr val="accent1"/>
+            </a:effectRef>
+            <a:fontRef idx="minor">
+              <a:schemeClr val="lt1"/>
+            </a:fontRef>
+          </p:style>
+          <p:txBody>
+            <a:bodyPr rtlCol="0" anchor="ctr"/>
+            <a:lstStyle/>
+            <a:p>
+              <a:pPr algn="ctr"/>
+              <a:endParaRPr lang="en-US"/>
+            </a:p>
+          </p:txBody>
+        </p:sp>
+        <p:sp>
+          <p:nvSpPr>
+            <p:cNvPr id="15" name="Rectangle 14"/>
+            <p:cNvSpPr/>
+            <p:nvPr/>
+          </p:nvSpPr>
+          <p:spPr>
+            <a:xfrm>
+              <a:off x="5857102" y="5346356"/>
+              <a:ext cx="469556" cy="354228"/>
+            </a:xfrm>
+            <a:prstGeom prst="rect">
+              <a:avLst/>
+            </a:prstGeom>
+            <a:noFill/>
+            <a:ln w="28575">
+              <a:solidFill>
+                <a:srgbClr val="FF0000"/>
+              </a:solidFill>
+            </a:ln>
+          </p:spPr>
+          <p:style>
+            <a:lnRef idx="2">
+              <a:schemeClr val="accent1">
+                <a:shade val="50000"/>
+              </a:schemeClr>
+            </a:lnRef>
+            <a:fillRef idx="1">
+              <a:schemeClr val="accent1"/>
+            </a:fillRef>
+            <a:effectRef idx="0">
+              <a:schemeClr val="accent1"/>
+            </a:effectRef>
+            <a:fontRef idx="minor">
+              <a:schemeClr val="lt1"/>
+            </a:fontRef>
+          </p:style>
+          <p:txBody>
+            <a:bodyPr rtlCol="0" anchor="ctr"/>
+            <a:lstStyle/>
+            <a:p>
+              <a:pPr algn="ctr"/>
+              <a:endParaRPr lang="en-US"/>
+            </a:p>
+          </p:txBody>
+        </p:sp>
+        <p:sp>
+          <p:nvSpPr>
+            <p:cNvPr id="17" name="Rectangle 16"/>
+            <p:cNvSpPr/>
+            <p:nvPr/>
+          </p:nvSpPr>
+          <p:spPr>
+            <a:xfrm>
+              <a:off x="6367849" y="4835611"/>
+              <a:ext cx="568409" cy="1103869"/>
+            </a:xfrm>
+            <a:prstGeom prst="rect">
+              <a:avLst/>
+            </a:prstGeom>
+            <a:noFill/>
+            <a:ln w="28575">
+              <a:solidFill>
+                <a:srgbClr val="FF0000"/>
+              </a:solidFill>
+            </a:ln>
+          </p:spPr>
+          <p:style>
+            <a:lnRef idx="2">
+              <a:schemeClr val="accent1">
+                <a:shade val="50000"/>
+              </a:schemeClr>
+            </a:lnRef>
+            <a:fillRef idx="1">
+              <a:schemeClr val="accent1"/>
+            </a:fillRef>
+            <a:effectRef idx="0">
+              <a:schemeClr val="accent1"/>
+            </a:effectRef>
+            <a:fontRef idx="minor">
+              <a:schemeClr val="lt1"/>
+            </a:fontRef>
+          </p:style>
+          <p:txBody>
+            <a:bodyPr rtlCol="0" anchor="ctr"/>
+            <a:lstStyle/>
+            <a:p>
+              <a:pPr algn="ctr"/>
+              <a:endParaRPr lang="en-US"/>
+            </a:p>
+          </p:txBody>
+        </p:sp>
+        <p:cxnSp>
+          <p:nvCxnSpPr>
+            <p:cNvPr id="19" name="Straight Connector 18"/>
+            <p:cNvCxnSpPr>
+              <a:stCxn id="5" idx="3"/>
+              <a:endCxn id="54" idx="1"/>
+            </p:cNvCxnSpPr>
+            <p:nvPr/>
+          </p:nvCxnSpPr>
+          <p:spPr>
+            <a:xfrm flipV="1">
+              <a:off x="6820930" y="468189"/>
+              <a:ext cx="1149591" cy="236147"/>
+            </a:xfrm>
+            <a:prstGeom prst="line">
+              <a:avLst/>
+            </a:prstGeom>
+            <a:ln w="19050">
+              <a:solidFill>
+                <a:srgbClr val="FF0000"/>
+              </a:solidFill>
+            </a:ln>
+          </p:spPr>
+          <p:style>
+            <a:lnRef idx="1">
+              <a:schemeClr val="accent1"/>
+            </a:lnRef>
+            <a:fillRef idx="0">
+              <a:schemeClr val="accent1"/>
+            </a:fillRef>
+            <a:effectRef idx="0">
+              <a:schemeClr val="accent1"/>
+            </a:effectRef>
+            <a:fontRef idx="minor">
+              <a:schemeClr val="tx1"/>
+            </a:fontRef>
+          </p:style>
+        </p:cxnSp>
+        <p:cxnSp>
+          <p:nvCxnSpPr>
+            <p:cNvPr id="21" name="Straight Connector 20"/>
+            <p:cNvCxnSpPr>
+              <a:stCxn id="6" idx="1"/>
+              <a:endCxn id="44" idx="3"/>
+            </p:cNvCxnSpPr>
+            <p:nvPr/>
+          </p:nvCxnSpPr>
+          <p:spPr>
+            <a:xfrm flipH="1" flipV="1">
+              <a:off x="5119980" y="857192"/>
+              <a:ext cx="1247869" cy="242559"/>
+            </a:xfrm>
+            <a:prstGeom prst="line">
+              <a:avLst/>
+            </a:prstGeom>
+            <a:ln w="19050">
+              <a:solidFill>
+                <a:srgbClr val="FF0000"/>
+              </a:solidFill>
+            </a:ln>
+          </p:spPr>
+          <p:style>
+            <a:lnRef idx="1">
+              <a:schemeClr val="accent1"/>
+            </a:lnRef>
+            <a:fillRef idx="0">
+              <a:schemeClr val="accent1"/>
+            </a:fillRef>
+            <a:effectRef idx="0">
+              <a:schemeClr val="accent1"/>
+            </a:effectRef>
+            <a:fontRef idx="minor">
+              <a:schemeClr val="tx1"/>
+            </a:fontRef>
+          </p:style>
+        </p:cxnSp>
+        <p:cxnSp>
+          <p:nvCxnSpPr>
+            <p:cNvPr id="23" name="Straight Connector 22"/>
+            <p:cNvCxnSpPr>
+              <a:stCxn id="7" idx="1"/>
+              <a:endCxn id="45" idx="3"/>
+            </p:cNvCxnSpPr>
+            <p:nvPr/>
+          </p:nvCxnSpPr>
+          <p:spPr>
+            <a:xfrm flipH="1" flipV="1">
+              <a:off x="5119980" y="1421596"/>
+              <a:ext cx="835975" cy="147712"/>
+            </a:xfrm>
+            <a:prstGeom prst="line">
+              <a:avLst/>
+            </a:prstGeom>
+            <a:ln w="19050">
+              <a:solidFill>
+                <a:srgbClr val="FF0000"/>
+              </a:solidFill>
+            </a:ln>
+          </p:spPr>
+          <p:style>
+            <a:lnRef idx="1">
+              <a:schemeClr val="accent1"/>
+            </a:lnRef>
+            <a:fillRef idx="0">
+              <a:schemeClr val="accent1"/>
+            </a:fillRef>
+            <a:effectRef idx="0">
+              <a:schemeClr val="accent1"/>
+            </a:effectRef>
+            <a:fontRef idx="minor">
+              <a:schemeClr val="tx1"/>
+            </a:fontRef>
+          </p:style>
+        </p:cxnSp>
+        <p:cxnSp>
+          <p:nvCxnSpPr>
+            <p:cNvPr id="25" name="Straight Connector 24"/>
+            <p:cNvCxnSpPr>
+              <a:stCxn id="9" idx="3"/>
+              <a:endCxn id="55" idx="1"/>
+            </p:cNvCxnSpPr>
+            <p:nvPr/>
+          </p:nvCxnSpPr>
+          <p:spPr>
+            <a:xfrm flipV="1">
+              <a:off x="7463481" y="1262682"/>
+              <a:ext cx="507040" cy="180997"/>
+            </a:xfrm>
+            <a:prstGeom prst="line">
+              <a:avLst/>
+            </a:prstGeom>
+            <a:ln w="19050">
+              <a:solidFill>
+                <a:srgbClr val="FF0000"/>
+              </a:solidFill>
+            </a:ln>
+          </p:spPr>
+          <p:style>
+            <a:lnRef idx="1">
+              <a:schemeClr val="accent1"/>
+            </a:lnRef>
+            <a:fillRef idx="0">
+              <a:schemeClr val="accent1"/>
+            </a:fillRef>
+            <a:effectRef idx="0">
+              <a:schemeClr val="accent1"/>
+            </a:effectRef>
+            <a:fontRef idx="minor">
+              <a:schemeClr val="tx1"/>
+            </a:fontRef>
+          </p:style>
+        </p:cxnSp>
+        <p:cxnSp>
+          <p:nvCxnSpPr>
+            <p:cNvPr id="29" name="Straight Connector 28"/>
+            <p:cNvCxnSpPr>
+              <a:stCxn id="8" idx="1"/>
+              <a:endCxn id="46" idx="3"/>
+            </p:cNvCxnSpPr>
+            <p:nvPr/>
+          </p:nvCxnSpPr>
+          <p:spPr>
+            <a:xfrm flipH="1" flipV="1">
+              <a:off x="5119980" y="2434738"/>
+              <a:ext cx="926593" cy="250797"/>
+            </a:xfrm>
+            <a:prstGeom prst="line">
+              <a:avLst/>
+            </a:prstGeom>
+            <a:ln w="19050">
+              <a:solidFill>
+                <a:srgbClr val="FF0000"/>
+              </a:solidFill>
+            </a:ln>
+          </p:spPr>
+          <p:style>
+            <a:lnRef idx="1">
+              <a:schemeClr val="accent1"/>
+            </a:lnRef>
+            <a:fillRef idx="0">
+              <a:schemeClr val="accent1"/>
+            </a:fillRef>
+            <a:effectRef idx="0">
+              <a:schemeClr val="accent1"/>
+            </a:effectRef>
+            <a:fontRef idx="minor">
+              <a:schemeClr val="tx1"/>
+            </a:fontRef>
+          </p:style>
+        </p:cxnSp>
+        <p:cxnSp>
+          <p:nvCxnSpPr>
+            <p:cNvPr id="31" name="Straight Connector 30"/>
+            <p:cNvCxnSpPr>
+              <a:stCxn id="14" idx="1"/>
+              <a:endCxn id="47" idx="3"/>
+            </p:cNvCxnSpPr>
+            <p:nvPr/>
+          </p:nvCxnSpPr>
+          <p:spPr>
+            <a:xfrm flipH="1" flipV="1">
+              <a:off x="5119980" y="3743067"/>
+              <a:ext cx="548192" cy="183835"/>
+            </a:xfrm>
+            <a:prstGeom prst="line">
+              <a:avLst/>
+            </a:prstGeom>
+            <a:ln w="19050">
+              <a:solidFill>
+                <a:srgbClr val="FF0000"/>
+              </a:solidFill>
+            </a:ln>
+          </p:spPr>
+          <p:style>
+            <a:lnRef idx="1">
+              <a:schemeClr val="accent1"/>
+            </a:lnRef>
+            <a:fillRef idx="0">
+              <a:schemeClr val="accent1"/>
+            </a:fillRef>
+            <a:effectRef idx="0">
+              <a:schemeClr val="accent1"/>
+            </a:effectRef>
+            <a:fontRef idx="minor">
+              <a:schemeClr val="tx1"/>
+            </a:fontRef>
+          </p:style>
+        </p:cxnSp>
+        <p:cxnSp>
+          <p:nvCxnSpPr>
+            <p:cNvPr id="33" name="Straight Connector 32"/>
+            <p:cNvCxnSpPr>
+              <a:stCxn id="10" idx="3"/>
+              <a:endCxn id="56" idx="1"/>
+            </p:cNvCxnSpPr>
+            <p:nvPr/>
+          </p:nvCxnSpPr>
+          <p:spPr>
+            <a:xfrm flipV="1">
+              <a:off x="7570573" y="2082348"/>
+              <a:ext cx="399948" cy="131571"/>
+            </a:xfrm>
+            <a:prstGeom prst="line">
+              <a:avLst/>
+            </a:prstGeom>
+            <a:ln w="19050">
+              <a:solidFill>
+                <a:srgbClr val="FF0000"/>
+              </a:solidFill>
+            </a:ln>
+          </p:spPr>
+          <p:style>
+            <a:lnRef idx="1">
+              <a:schemeClr val="accent1"/>
+            </a:lnRef>
+            <a:fillRef idx="0">
+              <a:schemeClr val="accent1"/>
+            </a:fillRef>
+            <a:effectRef idx="0">
+              <a:schemeClr val="accent1"/>
+            </a:effectRef>
+            <a:fontRef idx="minor">
+              <a:schemeClr val="tx1"/>
+            </a:fontRef>
+          </p:style>
+        </p:cxnSp>
+        <p:cxnSp>
+          <p:nvCxnSpPr>
+            <p:cNvPr id="35" name="Straight Connector 34"/>
+            <p:cNvCxnSpPr>
+              <a:stCxn id="11" idx="3"/>
+              <a:endCxn id="57" idx="1"/>
+            </p:cNvCxnSpPr>
+            <p:nvPr/>
+          </p:nvCxnSpPr>
+          <p:spPr>
+            <a:xfrm flipV="1">
+              <a:off x="7570573" y="2844573"/>
+              <a:ext cx="399948" cy="133404"/>
+            </a:xfrm>
+            <a:prstGeom prst="line">
+              <a:avLst/>
+            </a:prstGeom>
+            <a:ln w="19050">
+              <a:solidFill>
+                <a:srgbClr val="FF0000"/>
+              </a:solidFill>
+            </a:ln>
+          </p:spPr>
+          <p:style>
+            <a:lnRef idx="1">
+              <a:schemeClr val="accent1"/>
+            </a:lnRef>
+            <a:fillRef idx="0">
+              <a:schemeClr val="accent1"/>
+            </a:fillRef>
+            <a:effectRef idx="0">
+              <a:schemeClr val="accent1"/>
+            </a:effectRef>
+            <a:fontRef idx="minor">
+              <a:schemeClr val="tx1"/>
+            </a:fontRef>
+          </p:style>
+        </p:cxnSp>
+        <p:cxnSp>
+          <p:nvCxnSpPr>
+            <p:cNvPr id="37" name="Straight Connector 36"/>
+            <p:cNvCxnSpPr>
+              <a:stCxn id="12" idx="3"/>
+              <a:endCxn id="58" idx="1"/>
+            </p:cNvCxnSpPr>
+            <p:nvPr/>
+          </p:nvCxnSpPr>
+          <p:spPr>
+            <a:xfrm flipV="1">
+              <a:off x="7463481" y="3293765"/>
+              <a:ext cx="507040" cy="126991"/>
+            </a:xfrm>
+            <a:prstGeom prst="line">
+              <a:avLst/>
+            </a:prstGeom>
+            <a:ln w="19050">
+              <a:solidFill>
+                <a:srgbClr val="FF0000"/>
+              </a:solidFill>
+            </a:ln>
+          </p:spPr>
+          <p:style>
+            <a:lnRef idx="1">
+              <a:schemeClr val="accent1"/>
+            </a:lnRef>
+            <a:fillRef idx="0">
+              <a:schemeClr val="accent1"/>
+            </a:fillRef>
+            <a:effectRef idx="0">
+              <a:schemeClr val="accent1"/>
+            </a:effectRef>
+            <a:fontRef idx="minor">
+              <a:schemeClr val="tx1"/>
+            </a:fontRef>
+          </p:style>
+        </p:cxnSp>
+        <p:cxnSp>
+          <p:nvCxnSpPr>
+            <p:cNvPr id="39" name="Straight Connector 38"/>
+            <p:cNvCxnSpPr>
+              <a:stCxn id="13" idx="3"/>
+              <a:endCxn id="59" idx="1"/>
+            </p:cNvCxnSpPr>
+            <p:nvPr/>
+          </p:nvCxnSpPr>
+          <p:spPr>
+            <a:xfrm flipV="1">
+              <a:off x="7397578" y="3713434"/>
+              <a:ext cx="572943" cy="101715"/>
+            </a:xfrm>
+            <a:prstGeom prst="line">
+              <a:avLst/>
+            </a:prstGeom>
+            <a:ln w="19050">
+              <a:solidFill>
+                <a:srgbClr val="FF0000"/>
+              </a:solidFill>
+            </a:ln>
+          </p:spPr>
+          <p:style>
+            <a:lnRef idx="1">
+              <a:schemeClr val="accent1"/>
+            </a:lnRef>
+            <a:fillRef idx="0">
+              <a:schemeClr val="accent1"/>
+            </a:fillRef>
+            <a:effectRef idx="0">
+              <a:schemeClr val="accent1"/>
+            </a:effectRef>
+            <a:fontRef idx="minor">
+              <a:schemeClr val="tx1"/>
+            </a:fontRef>
+          </p:style>
+        </p:cxnSp>
+        <p:cxnSp>
+          <p:nvCxnSpPr>
+            <p:cNvPr id="41" name="Straight Connector 40"/>
+            <p:cNvCxnSpPr>
+              <a:stCxn id="15" idx="1"/>
+              <a:endCxn id="48" idx="3"/>
+            </p:cNvCxnSpPr>
+            <p:nvPr/>
+          </p:nvCxnSpPr>
+          <p:spPr>
+            <a:xfrm flipH="1" flipV="1">
+              <a:off x="5119980" y="5313190"/>
+              <a:ext cx="737122" cy="210280"/>
+            </a:xfrm>
+            <a:prstGeom prst="line">
+              <a:avLst/>
+            </a:prstGeom>
+            <a:ln w="19050">
+              <a:solidFill>
+                <a:srgbClr val="FF0000"/>
+              </a:solidFill>
+            </a:ln>
+          </p:spPr>
+          <p:style>
+            <a:lnRef idx="1">
+              <a:schemeClr val="accent1"/>
+            </a:lnRef>
+            <a:fillRef idx="0">
+              <a:schemeClr val="accent1"/>
+            </a:fillRef>
+            <a:effectRef idx="0">
+              <a:schemeClr val="accent1"/>
+            </a:effectRef>
+            <a:fontRef idx="minor">
+              <a:schemeClr val="tx1"/>
+            </a:fontRef>
+          </p:style>
+        </p:cxnSp>
+        <p:cxnSp>
+          <p:nvCxnSpPr>
+            <p:cNvPr id="43" name="Straight Connector 42"/>
+            <p:cNvCxnSpPr>
+              <a:stCxn id="17" idx="3"/>
+              <a:endCxn id="60" idx="1"/>
+            </p:cNvCxnSpPr>
+            <p:nvPr/>
+          </p:nvCxnSpPr>
+          <p:spPr>
+            <a:xfrm flipV="1">
+              <a:off x="6936258" y="5176570"/>
+              <a:ext cx="1034263" cy="210976"/>
+            </a:xfrm>
+            <a:prstGeom prst="line">
+              <a:avLst/>
+            </a:prstGeom>
+            <a:ln w="19050">
+              <a:solidFill>
+                <a:srgbClr val="FF0000"/>
+              </a:solidFill>
+            </a:ln>
+          </p:spPr>
+          <p:style>
+            <a:lnRef idx="1">
+              <a:schemeClr val="accent1"/>
+            </a:lnRef>
+            <a:fillRef idx="0">
+              <a:schemeClr val="accent1"/>
+            </a:fillRef>
+            <a:effectRef idx="0">
+              <a:schemeClr val="accent1"/>
+            </a:effectRef>
+            <a:fontRef idx="minor">
+              <a:schemeClr val="tx1"/>
+            </a:fontRef>
+          </p:style>
+        </p:cxnSp>
+        <p:sp>
+          <p:nvSpPr>
+            <p:cNvPr id="44" name="TextBox 43"/>
+            <p:cNvSpPr txBox="1"/>
+            <p:nvPr/>
+          </p:nvSpPr>
+          <p:spPr>
+            <a:xfrm>
+              <a:off x="4600996" y="734081"/>
+              <a:ext cx="518984" cy="246221"/>
+            </a:xfrm>
+            <a:prstGeom prst="rect">
+              <a:avLst/>
+            </a:prstGeom>
+            <a:noFill/>
+          </p:spPr>
+          <p:txBody>
+            <a:bodyPr wrap="square" rtlCol="0">
+              <a:spAutoFit/>
+            </a:bodyPr>
+            <a:lstStyle/>
+            <a:p>
+              <a:pPr algn="r"/>
+              <a:r>
+                <a:rPr lang="en-US" sz="1000" dirty="0" smtClean="0"/>
+                <a:t>Neck</a:t>
+              </a:r>
+              <a:endParaRPr lang="en-US" sz="1000" dirty="0"/>
+            </a:p>
+          </p:txBody>
+        </p:sp>
+        <p:sp>
+          <p:nvSpPr>
+            <p:cNvPr id="45" name="TextBox 44"/>
+            <p:cNvSpPr txBox="1"/>
+            <p:nvPr/>
+          </p:nvSpPr>
+          <p:spPr>
+            <a:xfrm>
+              <a:off x="4600996" y="1298485"/>
+              <a:ext cx="518984" cy="246221"/>
+            </a:xfrm>
+            <a:prstGeom prst="rect">
+              <a:avLst/>
+            </a:prstGeom>
+            <a:noFill/>
+          </p:spPr>
+          <p:txBody>
+            <a:bodyPr wrap="square" rtlCol="0">
+              <a:spAutoFit/>
+            </a:bodyPr>
+            <a:lstStyle/>
+            <a:p>
+              <a:pPr algn="r"/>
+              <a:r>
+                <a:rPr lang="en-US" sz="1000" dirty="0" smtClean="0"/>
+                <a:t>Chest</a:t>
+              </a:r>
+              <a:endParaRPr lang="en-US" sz="1000" dirty="0"/>
+            </a:p>
+          </p:txBody>
+        </p:sp>
+        <p:sp>
+          <p:nvSpPr>
+            <p:cNvPr id="46" name="TextBox 45"/>
+            <p:cNvSpPr txBox="1"/>
+            <p:nvPr/>
+          </p:nvSpPr>
+          <p:spPr>
+            <a:xfrm>
+              <a:off x="4600996" y="2311627"/>
+              <a:ext cx="518984" cy="246221"/>
+            </a:xfrm>
+            <a:prstGeom prst="rect">
+              <a:avLst/>
+            </a:prstGeom>
+            <a:noFill/>
+          </p:spPr>
+          <p:txBody>
+            <a:bodyPr wrap="square" rtlCol="0">
+              <a:spAutoFit/>
+            </a:bodyPr>
+            <a:lstStyle/>
+            <a:p>
+              <a:pPr algn="r"/>
+              <a:r>
+                <a:rPr lang="en-US" sz="1000" dirty="0" smtClean="0"/>
+                <a:t>Torso</a:t>
+              </a:r>
+              <a:endParaRPr lang="en-US" sz="1000" dirty="0"/>
+            </a:p>
+          </p:txBody>
+        </p:sp>
+        <p:sp>
+          <p:nvSpPr>
+            <p:cNvPr id="47" name="TextBox 46"/>
+            <p:cNvSpPr txBox="1"/>
+            <p:nvPr/>
+          </p:nvSpPr>
+          <p:spPr>
+            <a:xfrm>
+              <a:off x="4600996" y="3619956"/>
+              <a:ext cx="518984" cy="246221"/>
+            </a:xfrm>
+            <a:prstGeom prst="rect">
+              <a:avLst/>
+            </a:prstGeom>
+            <a:noFill/>
+          </p:spPr>
+          <p:txBody>
+            <a:bodyPr wrap="square" rtlCol="0">
+              <a:spAutoFit/>
+            </a:bodyPr>
+            <a:lstStyle/>
+            <a:p>
+              <a:pPr algn="r"/>
+              <a:r>
+                <a:rPr lang="en-US" sz="1000" dirty="0" smtClean="0"/>
+                <a:t>Thigh</a:t>
+              </a:r>
+              <a:endParaRPr lang="en-US" sz="1000" dirty="0"/>
+            </a:p>
+          </p:txBody>
+        </p:sp>
+        <p:sp>
+          <p:nvSpPr>
+            <p:cNvPr id="48" name="TextBox 47"/>
+            <p:cNvSpPr txBox="1"/>
+            <p:nvPr/>
+          </p:nvSpPr>
+          <p:spPr>
+            <a:xfrm>
+              <a:off x="4600996" y="5190079"/>
+              <a:ext cx="518984" cy="246221"/>
+            </a:xfrm>
+            <a:prstGeom prst="rect">
+              <a:avLst/>
+            </a:prstGeom>
+            <a:noFill/>
+          </p:spPr>
+          <p:txBody>
+            <a:bodyPr wrap="square" rtlCol="0">
+              <a:spAutoFit/>
+            </a:bodyPr>
+            <a:lstStyle/>
+            <a:p>
+              <a:pPr algn="r"/>
+              <a:r>
+                <a:rPr lang="en-US" sz="1000" dirty="0" smtClean="0"/>
+                <a:t>Ankle</a:t>
+              </a:r>
+              <a:endParaRPr lang="en-US" sz="1000" dirty="0"/>
+            </a:p>
+          </p:txBody>
+        </p:sp>
+        <p:sp>
+          <p:nvSpPr>
+            <p:cNvPr id="54" name="TextBox 53"/>
+            <p:cNvSpPr txBox="1"/>
+            <p:nvPr/>
+          </p:nvSpPr>
+          <p:spPr>
+            <a:xfrm>
+              <a:off x="7970521" y="345078"/>
+              <a:ext cx="518984" cy="246221"/>
+            </a:xfrm>
+            <a:prstGeom prst="rect">
+              <a:avLst/>
+            </a:prstGeom>
+            <a:noFill/>
+          </p:spPr>
+          <p:txBody>
+            <a:bodyPr wrap="square" rtlCol="0">
+              <a:spAutoFit/>
+            </a:bodyPr>
+            <a:lstStyle/>
+            <a:p>
+              <a:r>
+                <a:rPr lang="en-US" sz="1000" dirty="0" smtClean="0"/>
+                <a:t>Head</a:t>
+              </a:r>
+              <a:endParaRPr lang="en-US" sz="1000" dirty="0"/>
+            </a:p>
+          </p:txBody>
+        </p:sp>
+        <p:sp>
+          <p:nvSpPr>
+            <p:cNvPr id="55" name="TextBox 54"/>
+            <p:cNvSpPr txBox="1"/>
+            <p:nvPr/>
+          </p:nvSpPr>
+          <p:spPr>
+            <a:xfrm>
+              <a:off x="7970521" y="1139571"/>
+              <a:ext cx="683740" cy="246221"/>
+            </a:xfrm>
+            <a:prstGeom prst="rect">
+              <a:avLst/>
+            </a:prstGeom>
+            <a:noFill/>
+          </p:spPr>
+          <p:txBody>
+            <a:bodyPr wrap="square" rtlCol="0">
+              <a:spAutoFit/>
+            </a:bodyPr>
+            <a:lstStyle/>
+            <a:p>
+              <a:r>
+                <a:rPr lang="en-US" sz="1000" dirty="0" smtClean="0"/>
+                <a:t>Shoulder</a:t>
+              </a:r>
+              <a:endParaRPr lang="en-US" sz="1000" dirty="0"/>
+            </a:p>
+          </p:txBody>
+        </p:sp>
+        <p:sp>
+          <p:nvSpPr>
+            <p:cNvPr id="56" name="TextBox 55"/>
+            <p:cNvSpPr txBox="1"/>
+            <p:nvPr/>
+          </p:nvSpPr>
+          <p:spPr>
+            <a:xfrm>
+              <a:off x="7970521" y="1959237"/>
+              <a:ext cx="996778" cy="246221"/>
+            </a:xfrm>
+            <a:prstGeom prst="rect">
+              <a:avLst/>
+            </a:prstGeom>
+            <a:noFill/>
+          </p:spPr>
+          <p:txBody>
+            <a:bodyPr wrap="square" rtlCol="0">
+              <a:spAutoFit/>
+            </a:bodyPr>
+            <a:lstStyle/>
+            <a:p>
+              <a:r>
+                <a:rPr lang="en-US" sz="1000" dirty="0" smtClean="0"/>
+                <a:t>Upper Arm</a:t>
+              </a:r>
+              <a:endParaRPr lang="en-US" sz="1000" dirty="0"/>
+            </a:p>
+          </p:txBody>
+        </p:sp>
+        <p:sp>
+          <p:nvSpPr>
+            <p:cNvPr id="57" name="TextBox 56"/>
+            <p:cNvSpPr txBox="1"/>
+            <p:nvPr/>
+          </p:nvSpPr>
+          <p:spPr>
+            <a:xfrm>
+              <a:off x="7970521" y="2721462"/>
+              <a:ext cx="996778" cy="246221"/>
+            </a:xfrm>
+            <a:prstGeom prst="rect">
+              <a:avLst/>
+            </a:prstGeom>
+            <a:noFill/>
+          </p:spPr>
+          <p:txBody>
+            <a:bodyPr wrap="square" rtlCol="0">
+              <a:spAutoFit/>
+            </a:bodyPr>
+            <a:lstStyle/>
+            <a:p>
+              <a:r>
+                <a:rPr lang="en-US" sz="1000" dirty="0" smtClean="0"/>
+                <a:t>Lower Arm</a:t>
+              </a:r>
+              <a:endParaRPr lang="en-US" sz="1000" dirty="0"/>
+            </a:p>
+          </p:txBody>
+        </p:sp>
+        <p:sp>
+          <p:nvSpPr>
+            <p:cNvPr id="58" name="TextBox 57"/>
+            <p:cNvSpPr txBox="1"/>
+            <p:nvPr/>
+          </p:nvSpPr>
+          <p:spPr>
+            <a:xfrm>
+              <a:off x="7970521" y="3170654"/>
+              <a:ext cx="996778" cy="246221"/>
+            </a:xfrm>
+            <a:prstGeom prst="rect">
+              <a:avLst/>
+            </a:prstGeom>
+            <a:noFill/>
+          </p:spPr>
+          <p:txBody>
+            <a:bodyPr wrap="square" rtlCol="0">
+              <a:spAutoFit/>
+            </a:bodyPr>
+            <a:lstStyle/>
+            <a:p>
+              <a:r>
+                <a:rPr lang="en-US" sz="1000" dirty="0" smtClean="0"/>
+                <a:t>Wrist</a:t>
+              </a:r>
+              <a:endParaRPr lang="en-US" sz="1000" dirty="0"/>
+            </a:p>
+          </p:txBody>
+        </p:sp>
+        <p:sp>
+          <p:nvSpPr>
+            <p:cNvPr id="59" name="TextBox 58"/>
+            <p:cNvSpPr txBox="1"/>
+            <p:nvPr/>
+          </p:nvSpPr>
+          <p:spPr>
+            <a:xfrm>
+              <a:off x="7970521" y="3590323"/>
+              <a:ext cx="996778" cy="246221"/>
+            </a:xfrm>
+            <a:prstGeom prst="rect">
+              <a:avLst/>
+            </a:prstGeom>
+            <a:noFill/>
+          </p:spPr>
+          <p:txBody>
+            <a:bodyPr wrap="square" rtlCol="0">
+              <a:spAutoFit/>
+            </a:bodyPr>
+            <a:lstStyle/>
+            <a:p>
+              <a:r>
+                <a:rPr lang="en-US" sz="1000" dirty="0" smtClean="0"/>
+                <a:t>Hand</a:t>
+              </a:r>
+              <a:endParaRPr lang="en-US" sz="1000" dirty="0"/>
+            </a:p>
+          </p:txBody>
+        </p:sp>
+        <p:sp>
+          <p:nvSpPr>
+            <p:cNvPr id="60" name="TextBox 59"/>
+            <p:cNvSpPr txBox="1"/>
+            <p:nvPr/>
+          </p:nvSpPr>
+          <p:spPr>
+            <a:xfrm>
+              <a:off x="7970521" y="5053459"/>
+              <a:ext cx="996778" cy="246221"/>
+            </a:xfrm>
+            <a:prstGeom prst="rect">
+              <a:avLst/>
+            </a:prstGeom>
+            <a:noFill/>
+          </p:spPr>
+          <p:txBody>
+            <a:bodyPr wrap="square" rtlCol="0">
+              <a:spAutoFit/>
+            </a:bodyPr>
+            <a:lstStyle/>
+            <a:p>
+              <a:r>
+                <a:rPr lang="en-US" sz="1000" dirty="0" smtClean="0"/>
+                <a:t>Shin</a:t>
+              </a:r>
+              <a:endParaRPr lang="en-US" sz="1000" dirty="0"/>
+            </a:p>
+          </p:txBody>
+        </p:sp>
+      </p:grpSp>
+    </p:spTree>
+    <p:extLst>
+      <p:ext uri="{BB962C8B-B14F-4D97-AF65-F5344CB8AC3E}">
+        <p14:creationId xmlns:p14="http://schemas.microsoft.com/office/powerpoint/2010/main" val="3183320612"/>
+      </p:ext>
+    </p:extLst>
+  </p:cSld>
+  <p:clrMapOvr>
+    <a:masterClrMapping/>
+  </p:clrMapOvr>
+</p:sld>
+</file>
+
+<file path=ppt/slides/slide4.xml><?xml version="1.0" encoding="utf-8"?>
+<p:sld xmlns:a="http://schemas.openxmlformats.org/drawingml/2006/main" xmlns:r="http://schemas.openxmlformats.org/officeDocument/2006/relationships" xmlns:p="http://schemas.openxmlformats.org/presentationml/2006/main">
+  <p:cSld>
+    <p:spTree>
+      <p:nvGrpSpPr>
+        <p:cNvPr id="1" name=""/>
+        <p:cNvGrpSpPr/>
+        <p:nvPr/>
+      </p:nvGrpSpPr>
+      <p:grpSpPr>
+        <a:xfrm>
+          <a:off x="0" y="0"/>
+          <a:ext cx="0" cy="0"/>
+          <a:chOff x="0" y="0"/>
+          <a:chExt cx="0" cy="0"/>
+        </a:xfrm>
+      </p:grpSpPr>
+      <p:grpSp>
+        <p:nvGrpSpPr>
+          <p:cNvPr id="54" name="Group 53"/>
+          <p:cNvGrpSpPr/>
+          <p:nvPr/>
+        </p:nvGrpSpPr>
+        <p:grpSpPr>
+          <a:xfrm>
+            <a:off x="2944368" y="952092"/>
+            <a:ext cx="6238091" cy="5479447"/>
+            <a:chOff x="2944368" y="952092"/>
+            <a:chExt cx="6238091" cy="5479447"/>
+          </a:xfrm>
+        </p:grpSpPr>
+        <p:pic>
+          <p:nvPicPr>
+            <p:cNvPr id="4" name="Picture 3"/>
+            <p:cNvPicPr>
+              <a:picLocks noChangeAspect="1"/>
+            </p:cNvPicPr>
+            <p:nvPr/>
+          </p:nvPicPr>
+          <p:blipFill rotWithShape="1">
+            <a:blip r:embed="rId2" cstate="print">
+              <a:extLst>
+                <a:ext uri="{28A0092B-C50C-407E-A947-70E740481C1C}">
+                  <a14:useLocalDpi xmlns:a14="http://schemas.microsoft.com/office/drawing/2010/main" val="0"/>
+                </a:ext>
+              </a:extLst>
+            </a:blip>
+            <a:srcRect t="22800"/>
+            <a:stretch/>
+          </p:blipFill>
+          <p:spPr>
+            <a:xfrm>
+              <a:off x="4962556" y="978408"/>
+              <a:ext cx="4219903" cy="5294376"/>
+            </a:xfrm>
+            <a:prstGeom prst="rect">
+              <a:avLst/>
+            </a:prstGeom>
+          </p:spPr>
+        </p:pic>
+        <p:pic>
+          <p:nvPicPr>
+            <p:cNvPr id="5" name="Picture 4"/>
+            <p:cNvPicPr>
+              <a:picLocks noChangeAspect="1"/>
+            </p:cNvPicPr>
+            <p:nvPr/>
+          </p:nvPicPr>
+          <p:blipFill rotWithShape="1">
+            <a:blip r:embed="rId3" cstate="print">
+              <a:extLst>
+                <a:ext uri="{28A0092B-C50C-407E-A947-70E740481C1C}">
+                  <a14:useLocalDpi xmlns:a14="http://schemas.microsoft.com/office/drawing/2010/main" val="0"/>
+                </a:ext>
+              </a:extLst>
+            </a:blip>
+            <a:srcRect t="23333"/>
+            <a:stretch/>
+          </p:blipFill>
+          <p:spPr>
+            <a:xfrm>
+              <a:off x="2944368" y="1014984"/>
+              <a:ext cx="4219903" cy="5257800"/>
+            </a:xfrm>
+            <a:prstGeom prst="rect">
+              <a:avLst/>
+            </a:prstGeom>
+          </p:spPr>
+        </p:pic>
+        <p:cxnSp>
+          <p:nvCxnSpPr>
+            <p:cNvPr id="7" name="Straight Connector 6"/>
+            <p:cNvCxnSpPr/>
+            <p:nvPr/>
+          </p:nvCxnSpPr>
+          <p:spPr>
+            <a:xfrm>
+              <a:off x="8415281" y="5403693"/>
+              <a:ext cx="0" cy="486032"/>
+            </a:xfrm>
+            <a:prstGeom prst="line">
+              <a:avLst/>
+            </a:prstGeom>
+            <a:ln w="28575">
+              <a:solidFill>
+                <a:srgbClr val="FF0000"/>
+              </a:solidFill>
+              <a:headEnd type="triangle"/>
+            </a:ln>
+          </p:spPr>
+          <p:style>
+            <a:lnRef idx="1">
+              <a:schemeClr val="accent1"/>
+            </a:lnRef>
+            <a:fillRef idx="0">
+              <a:schemeClr val="accent1"/>
+            </a:fillRef>
+            <a:effectRef idx="0">
+              <a:schemeClr val="accent1"/>
+            </a:effectRef>
+            <a:fontRef idx="minor">
+              <a:schemeClr val="tx1"/>
+            </a:fontRef>
+          </p:style>
+        </p:cxnSp>
+        <p:cxnSp>
+          <p:nvCxnSpPr>
+            <p:cNvPr id="9" name="Straight Connector 8"/>
+            <p:cNvCxnSpPr/>
+            <p:nvPr/>
+          </p:nvCxnSpPr>
+          <p:spPr>
+            <a:xfrm>
+              <a:off x="8407043" y="5897963"/>
+              <a:ext cx="469557" cy="0"/>
+            </a:xfrm>
+            <a:prstGeom prst="line">
+              <a:avLst/>
+            </a:prstGeom>
+            <a:ln w="28575">
+              <a:solidFill>
+                <a:schemeClr val="accent1">
+                  <a:lumMod val="75000"/>
+                </a:schemeClr>
+              </a:solidFill>
+              <a:headEnd type="none"/>
+              <a:tailEnd type="triangle"/>
+            </a:ln>
+          </p:spPr>
+          <p:style>
+            <a:lnRef idx="1">
+              <a:schemeClr val="accent1"/>
+            </a:lnRef>
+            <a:fillRef idx="0">
+              <a:schemeClr val="accent1"/>
+            </a:fillRef>
+            <a:effectRef idx="0">
+              <a:schemeClr val="accent1"/>
+            </a:effectRef>
+            <a:fontRef idx="minor">
+              <a:schemeClr val="tx1"/>
+            </a:fontRef>
+          </p:style>
+        </p:cxnSp>
+        <p:grpSp>
+          <p:nvGrpSpPr>
+            <p:cNvPr id="14" name="Group 13"/>
+            <p:cNvGrpSpPr/>
+            <p:nvPr/>
+          </p:nvGrpSpPr>
+          <p:grpSpPr>
+            <a:xfrm>
+              <a:off x="6767741" y="5385158"/>
+              <a:ext cx="215213" cy="226540"/>
+              <a:chOff x="6157784" y="5960076"/>
+              <a:chExt cx="469557" cy="494270"/>
+            </a:xfrm>
+          </p:grpSpPr>
+          <p:cxnSp>
+            <p:nvCxnSpPr>
+              <p:cNvPr id="12" name="Straight Connector 11"/>
+              <p:cNvCxnSpPr/>
+              <p:nvPr/>
+            </p:nvCxnSpPr>
+            <p:spPr>
+              <a:xfrm>
+                <a:off x="6166022" y="5960076"/>
+                <a:ext cx="0" cy="486032"/>
+              </a:xfrm>
+              <a:prstGeom prst="line">
+                <a:avLst/>
+              </a:prstGeom>
+              <a:ln w="28575">
+                <a:solidFill>
+                  <a:srgbClr val="FF0000"/>
+                </a:solidFill>
+              </a:ln>
+            </p:spPr>
+            <p:style>
+              <a:lnRef idx="1">
+                <a:schemeClr val="accent1"/>
+              </a:lnRef>
+              <a:fillRef idx="0">
+                <a:schemeClr val="accent1"/>
+              </a:fillRef>
+              <a:effectRef idx="0">
+                <a:schemeClr val="accent1"/>
+              </a:effectRef>
+              <a:fontRef idx="minor">
+                <a:schemeClr val="tx1"/>
+              </a:fontRef>
+            </p:style>
+          </p:cxnSp>
+          <p:cxnSp>
+            <p:nvCxnSpPr>
+              <p:cNvPr id="13" name="Straight Connector 12"/>
+              <p:cNvCxnSpPr/>
+              <p:nvPr/>
+            </p:nvCxnSpPr>
+            <p:spPr>
+              <a:xfrm>
+                <a:off x="6157784" y="6454346"/>
+                <a:ext cx="469557" cy="0"/>
+              </a:xfrm>
+              <a:prstGeom prst="line">
+                <a:avLst/>
+              </a:prstGeom>
+              <a:ln w="28575">
+                <a:solidFill>
+                  <a:schemeClr val="accent1">
+                    <a:lumMod val="75000"/>
+                  </a:schemeClr>
+                </a:solidFill>
+              </a:ln>
+            </p:spPr>
+            <p:style>
+              <a:lnRef idx="1">
+                <a:schemeClr val="accent1"/>
+              </a:lnRef>
+              <a:fillRef idx="0">
+                <a:schemeClr val="accent1"/>
+              </a:fillRef>
+              <a:effectRef idx="0">
+                <a:schemeClr val="accent1"/>
+              </a:effectRef>
+              <a:fontRef idx="minor">
+                <a:schemeClr val="tx1"/>
+              </a:fontRef>
+            </p:style>
+          </p:cxnSp>
+        </p:grpSp>
+        <p:grpSp>
+          <p:nvGrpSpPr>
+            <p:cNvPr id="15" name="Group 14"/>
+            <p:cNvGrpSpPr/>
+            <p:nvPr/>
+          </p:nvGrpSpPr>
+          <p:grpSpPr>
+            <a:xfrm>
+              <a:off x="6763619" y="3906456"/>
+              <a:ext cx="215213" cy="226540"/>
+              <a:chOff x="6157784" y="5960076"/>
+              <a:chExt cx="469557" cy="494270"/>
+            </a:xfrm>
+          </p:grpSpPr>
+          <p:cxnSp>
+            <p:nvCxnSpPr>
+              <p:cNvPr id="16" name="Straight Connector 15"/>
+              <p:cNvCxnSpPr/>
+              <p:nvPr/>
+            </p:nvCxnSpPr>
+            <p:spPr>
+              <a:xfrm>
+                <a:off x="6166022" y="5960076"/>
+                <a:ext cx="0" cy="486032"/>
+              </a:xfrm>
+              <a:prstGeom prst="line">
+                <a:avLst/>
+              </a:prstGeom>
+              <a:ln w="28575">
+                <a:solidFill>
+                  <a:srgbClr val="FF0000"/>
+                </a:solidFill>
+              </a:ln>
+            </p:spPr>
+            <p:style>
+              <a:lnRef idx="1">
+                <a:schemeClr val="accent1"/>
+              </a:lnRef>
+              <a:fillRef idx="0">
+                <a:schemeClr val="accent1"/>
+              </a:fillRef>
+              <a:effectRef idx="0">
+                <a:schemeClr val="accent1"/>
+              </a:effectRef>
+              <a:fontRef idx="minor">
+                <a:schemeClr val="tx1"/>
+              </a:fontRef>
+            </p:style>
+          </p:cxnSp>
+          <p:cxnSp>
+            <p:nvCxnSpPr>
+              <p:cNvPr id="17" name="Straight Connector 16"/>
+              <p:cNvCxnSpPr/>
+              <p:nvPr/>
+            </p:nvCxnSpPr>
+            <p:spPr>
+              <a:xfrm>
+                <a:off x="6157784" y="6454346"/>
+                <a:ext cx="469557" cy="0"/>
+              </a:xfrm>
+              <a:prstGeom prst="line">
+                <a:avLst/>
+              </a:prstGeom>
+              <a:ln w="28575">
+                <a:solidFill>
+                  <a:schemeClr val="accent1">
+                    <a:lumMod val="75000"/>
+                  </a:schemeClr>
+                </a:solidFill>
+              </a:ln>
+            </p:spPr>
+            <p:style>
+              <a:lnRef idx="1">
+                <a:schemeClr val="accent1"/>
+              </a:lnRef>
+              <a:fillRef idx="0">
+                <a:schemeClr val="accent1"/>
+              </a:fillRef>
+              <a:effectRef idx="0">
+                <a:schemeClr val="accent1"/>
+              </a:effectRef>
+              <a:fontRef idx="minor">
+                <a:schemeClr val="tx1"/>
+              </a:fontRef>
+            </p:style>
+          </p:cxnSp>
+        </p:grpSp>
+        <p:grpSp>
+          <p:nvGrpSpPr>
+            <p:cNvPr id="18" name="Group 17"/>
+            <p:cNvGrpSpPr/>
+            <p:nvPr/>
+          </p:nvGrpSpPr>
+          <p:grpSpPr>
+            <a:xfrm>
+              <a:off x="6767735" y="2477190"/>
+              <a:ext cx="215213" cy="226540"/>
+              <a:chOff x="6157784" y="5960076"/>
+              <a:chExt cx="469557" cy="494270"/>
+            </a:xfrm>
+          </p:grpSpPr>
+          <p:cxnSp>
+            <p:nvCxnSpPr>
+              <p:cNvPr id="19" name="Straight Connector 18"/>
+              <p:cNvCxnSpPr/>
+              <p:nvPr/>
+            </p:nvCxnSpPr>
+            <p:spPr>
+              <a:xfrm>
+                <a:off x="6166022" y="5960076"/>
+                <a:ext cx="0" cy="486032"/>
+              </a:xfrm>
+              <a:prstGeom prst="line">
+                <a:avLst/>
+              </a:prstGeom>
+              <a:ln w="28575">
+                <a:solidFill>
+                  <a:srgbClr val="FF0000"/>
+                </a:solidFill>
+              </a:ln>
+            </p:spPr>
+            <p:style>
+              <a:lnRef idx="1">
+                <a:schemeClr val="accent1"/>
+              </a:lnRef>
+              <a:fillRef idx="0">
+                <a:schemeClr val="accent1"/>
+              </a:fillRef>
+              <a:effectRef idx="0">
+                <a:schemeClr val="accent1"/>
+              </a:effectRef>
+              <a:fontRef idx="minor">
+                <a:schemeClr val="tx1"/>
+              </a:fontRef>
+            </p:style>
+          </p:cxnSp>
+          <p:cxnSp>
+            <p:nvCxnSpPr>
+              <p:cNvPr id="20" name="Straight Connector 19"/>
+              <p:cNvCxnSpPr/>
+              <p:nvPr/>
+            </p:nvCxnSpPr>
+            <p:spPr>
+              <a:xfrm>
+                <a:off x="6157784" y="6454346"/>
+                <a:ext cx="469557" cy="0"/>
+              </a:xfrm>
+              <a:prstGeom prst="line">
+                <a:avLst/>
+              </a:prstGeom>
+              <a:ln w="28575">
+                <a:solidFill>
+                  <a:schemeClr val="accent1">
+                    <a:lumMod val="75000"/>
+                  </a:schemeClr>
+                </a:solidFill>
+              </a:ln>
+            </p:spPr>
+            <p:style>
+              <a:lnRef idx="1">
+                <a:schemeClr val="accent1"/>
+              </a:lnRef>
+              <a:fillRef idx="0">
+                <a:schemeClr val="accent1"/>
+              </a:fillRef>
+              <a:effectRef idx="0">
+                <a:schemeClr val="accent1"/>
+              </a:effectRef>
+              <a:fontRef idx="minor">
+                <a:schemeClr val="tx1"/>
+              </a:fontRef>
+            </p:style>
+          </p:cxnSp>
+        </p:grpSp>
+        <p:grpSp>
+          <p:nvGrpSpPr>
+            <p:cNvPr id="21" name="Group 20"/>
+            <p:cNvGrpSpPr/>
+            <p:nvPr/>
+          </p:nvGrpSpPr>
+          <p:grpSpPr>
+            <a:xfrm>
+              <a:off x="7134316" y="1056154"/>
+              <a:ext cx="215213" cy="226540"/>
+              <a:chOff x="6157784" y="5960076"/>
+              <a:chExt cx="469557" cy="494270"/>
+            </a:xfrm>
+          </p:grpSpPr>
+          <p:cxnSp>
+            <p:nvCxnSpPr>
+              <p:cNvPr id="22" name="Straight Connector 21"/>
+              <p:cNvCxnSpPr/>
+              <p:nvPr/>
+            </p:nvCxnSpPr>
+            <p:spPr>
+              <a:xfrm>
+                <a:off x="6166022" y="5960076"/>
+                <a:ext cx="0" cy="486032"/>
+              </a:xfrm>
+              <a:prstGeom prst="line">
+                <a:avLst/>
+              </a:prstGeom>
+              <a:ln w="28575">
+                <a:solidFill>
+                  <a:srgbClr val="FF0000"/>
+                </a:solidFill>
+              </a:ln>
+            </p:spPr>
+            <p:style>
+              <a:lnRef idx="1">
+                <a:schemeClr val="accent1"/>
+              </a:lnRef>
+              <a:fillRef idx="0">
+                <a:schemeClr val="accent1"/>
+              </a:fillRef>
+              <a:effectRef idx="0">
+                <a:schemeClr val="accent1"/>
+              </a:effectRef>
+              <a:fontRef idx="minor">
+                <a:schemeClr val="tx1"/>
+              </a:fontRef>
+            </p:style>
+          </p:cxnSp>
+          <p:cxnSp>
+            <p:nvCxnSpPr>
+              <p:cNvPr id="23" name="Straight Connector 22"/>
+              <p:cNvCxnSpPr/>
+              <p:nvPr/>
+            </p:nvCxnSpPr>
+            <p:spPr>
+              <a:xfrm>
+                <a:off x="6157784" y="6454346"/>
+                <a:ext cx="469557" cy="0"/>
+              </a:xfrm>
+              <a:prstGeom prst="line">
+                <a:avLst/>
+              </a:prstGeom>
+              <a:ln w="28575">
+                <a:solidFill>
+                  <a:schemeClr val="accent1">
+                    <a:lumMod val="75000"/>
+                  </a:schemeClr>
+                </a:solidFill>
+              </a:ln>
+            </p:spPr>
+            <p:style>
+              <a:lnRef idx="1">
+                <a:schemeClr val="accent1"/>
+              </a:lnRef>
+              <a:fillRef idx="0">
+                <a:schemeClr val="accent1"/>
+              </a:fillRef>
+              <a:effectRef idx="0">
+                <a:schemeClr val="accent1"/>
+              </a:effectRef>
+              <a:fontRef idx="minor">
+                <a:schemeClr val="tx1"/>
+              </a:fontRef>
+            </p:style>
+          </p:cxnSp>
+        </p:grpSp>
+        <p:grpSp>
+          <p:nvGrpSpPr>
+            <p:cNvPr id="37" name="Group 36"/>
+            <p:cNvGrpSpPr/>
+            <p:nvPr/>
+          </p:nvGrpSpPr>
+          <p:grpSpPr>
+            <a:xfrm>
+              <a:off x="4893721" y="5389274"/>
+              <a:ext cx="215213" cy="226540"/>
+              <a:chOff x="4444347" y="5974490"/>
+              <a:chExt cx="215213" cy="226540"/>
+            </a:xfrm>
+          </p:grpSpPr>
+          <p:cxnSp>
+            <p:nvCxnSpPr>
+              <p:cNvPr id="25" name="Straight Connector 24"/>
+              <p:cNvCxnSpPr/>
+              <p:nvPr/>
+            </p:nvCxnSpPr>
+            <p:spPr>
+              <a:xfrm>
+                <a:off x="4448123" y="5974490"/>
+                <a:ext cx="0" cy="222764"/>
+              </a:xfrm>
+              <a:prstGeom prst="line">
+                <a:avLst/>
+              </a:prstGeom>
+              <a:ln w="28575">
+                <a:solidFill>
+                  <a:srgbClr val="FF0000"/>
+                </a:solidFill>
+              </a:ln>
+            </p:spPr>
+            <p:style>
+              <a:lnRef idx="1">
+                <a:schemeClr val="accent1"/>
+              </a:lnRef>
+              <a:fillRef idx="0">
+                <a:schemeClr val="accent1"/>
+              </a:fillRef>
+              <a:effectRef idx="0">
+                <a:schemeClr val="accent1"/>
+              </a:effectRef>
+              <a:fontRef idx="minor">
+                <a:schemeClr val="tx1"/>
+              </a:fontRef>
+            </p:style>
+          </p:cxnSp>
+          <p:cxnSp>
+            <p:nvCxnSpPr>
+              <p:cNvPr id="26" name="Straight Connector 25"/>
+              <p:cNvCxnSpPr/>
+              <p:nvPr/>
+            </p:nvCxnSpPr>
+            <p:spPr>
+              <a:xfrm>
+                <a:off x="4444347" y="6201030"/>
+                <a:ext cx="215213" cy="0"/>
+              </a:xfrm>
+              <a:prstGeom prst="line">
+                <a:avLst/>
+              </a:prstGeom>
+              <a:ln w="28575">
+                <a:solidFill>
+                  <a:schemeClr val="accent6"/>
+                </a:solidFill>
+              </a:ln>
+            </p:spPr>
+            <p:style>
+              <a:lnRef idx="1">
+                <a:schemeClr val="accent1"/>
+              </a:lnRef>
+              <a:fillRef idx="0">
+                <a:schemeClr val="accent1"/>
+              </a:fillRef>
+              <a:effectRef idx="0">
+                <a:schemeClr val="accent1"/>
+              </a:effectRef>
+              <a:fontRef idx="minor">
+                <a:schemeClr val="tx1"/>
+              </a:fontRef>
+            </p:style>
+          </p:cxnSp>
+        </p:grpSp>
+        <p:grpSp>
+          <p:nvGrpSpPr>
+            <p:cNvPr id="36" name="Group 35"/>
+            <p:cNvGrpSpPr/>
+            <p:nvPr/>
+          </p:nvGrpSpPr>
+          <p:grpSpPr>
+            <a:xfrm>
+              <a:off x="4889599" y="3927048"/>
+              <a:ext cx="215213" cy="226540"/>
+              <a:chOff x="4440225" y="4512264"/>
+              <a:chExt cx="215213" cy="226540"/>
+            </a:xfrm>
+          </p:grpSpPr>
+          <p:cxnSp>
+            <p:nvCxnSpPr>
+              <p:cNvPr id="28" name="Straight Connector 27"/>
+              <p:cNvCxnSpPr/>
+              <p:nvPr/>
+            </p:nvCxnSpPr>
+            <p:spPr>
+              <a:xfrm>
+                <a:off x="4444001" y="4512264"/>
+                <a:ext cx="0" cy="222764"/>
+              </a:xfrm>
+              <a:prstGeom prst="line">
+                <a:avLst/>
+              </a:prstGeom>
+              <a:ln w="28575">
+                <a:solidFill>
+                  <a:srgbClr val="FF0000"/>
+                </a:solidFill>
+              </a:ln>
+            </p:spPr>
+            <p:style>
+              <a:lnRef idx="1">
+                <a:schemeClr val="accent1"/>
+              </a:lnRef>
+              <a:fillRef idx="0">
+                <a:schemeClr val="accent1"/>
+              </a:fillRef>
+              <a:effectRef idx="0">
+                <a:schemeClr val="accent1"/>
+              </a:effectRef>
+              <a:fontRef idx="minor">
+                <a:schemeClr val="tx1"/>
+              </a:fontRef>
+            </p:style>
+          </p:cxnSp>
+          <p:cxnSp>
+            <p:nvCxnSpPr>
+              <p:cNvPr id="29" name="Straight Connector 28"/>
+              <p:cNvCxnSpPr/>
+              <p:nvPr/>
+            </p:nvCxnSpPr>
+            <p:spPr>
+              <a:xfrm>
+                <a:off x="4440225" y="4738804"/>
+                <a:ext cx="215213" cy="0"/>
+              </a:xfrm>
+              <a:prstGeom prst="line">
+                <a:avLst/>
+              </a:prstGeom>
+              <a:ln w="28575">
+                <a:solidFill>
+                  <a:schemeClr val="accent6"/>
+                </a:solidFill>
+              </a:ln>
+            </p:spPr>
+            <p:style>
+              <a:lnRef idx="1">
+                <a:schemeClr val="accent1"/>
+              </a:lnRef>
+              <a:fillRef idx="0">
+                <a:schemeClr val="accent1"/>
+              </a:fillRef>
+              <a:effectRef idx="0">
+                <a:schemeClr val="accent1"/>
+              </a:effectRef>
+              <a:fontRef idx="minor">
+                <a:schemeClr val="tx1"/>
+              </a:fontRef>
+            </p:style>
+          </p:cxnSp>
+        </p:grpSp>
+        <p:grpSp>
+          <p:nvGrpSpPr>
+            <p:cNvPr id="35" name="Group 34"/>
+            <p:cNvGrpSpPr/>
+            <p:nvPr/>
+          </p:nvGrpSpPr>
+          <p:grpSpPr>
+            <a:xfrm>
+              <a:off x="4893715" y="2481306"/>
+              <a:ext cx="215213" cy="226540"/>
+              <a:chOff x="4444341" y="3066522"/>
+              <a:chExt cx="215213" cy="226540"/>
+            </a:xfrm>
+          </p:grpSpPr>
+          <p:cxnSp>
+            <p:nvCxnSpPr>
+              <p:cNvPr id="31" name="Straight Connector 30"/>
+              <p:cNvCxnSpPr/>
+              <p:nvPr/>
+            </p:nvCxnSpPr>
+            <p:spPr>
+              <a:xfrm>
+                <a:off x="4448117" y="3066522"/>
+                <a:ext cx="0" cy="222764"/>
+              </a:xfrm>
+              <a:prstGeom prst="line">
+                <a:avLst/>
+              </a:prstGeom>
+              <a:ln w="28575">
+                <a:solidFill>
+                  <a:srgbClr val="FF0000"/>
+                </a:solidFill>
+              </a:ln>
+            </p:spPr>
+            <p:style>
+              <a:lnRef idx="1">
+                <a:schemeClr val="accent1"/>
+              </a:lnRef>
+              <a:fillRef idx="0">
+                <a:schemeClr val="accent1"/>
+              </a:fillRef>
+              <a:effectRef idx="0">
+                <a:schemeClr val="accent1"/>
+              </a:effectRef>
+              <a:fontRef idx="minor">
+                <a:schemeClr val="tx1"/>
+              </a:fontRef>
+            </p:style>
+          </p:cxnSp>
+          <p:cxnSp>
+            <p:nvCxnSpPr>
+              <p:cNvPr id="32" name="Straight Connector 31"/>
+              <p:cNvCxnSpPr/>
+              <p:nvPr/>
+            </p:nvCxnSpPr>
+            <p:spPr>
+              <a:xfrm>
+                <a:off x="4444341" y="3293062"/>
+                <a:ext cx="215213" cy="0"/>
+              </a:xfrm>
+              <a:prstGeom prst="line">
+                <a:avLst/>
+              </a:prstGeom>
+              <a:ln w="28575">
+                <a:solidFill>
+                  <a:schemeClr val="accent6"/>
+                </a:solidFill>
+              </a:ln>
+            </p:spPr>
+            <p:style>
+              <a:lnRef idx="1">
+                <a:schemeClr val="accent1"/>
+              </a:lnRef>
+              <a:fillRef idx="0">
+                <a:schemeClr val="accent1"/>
+              </a:fillRef>
+              <a:effectRef idx="0">
+                <a:schemeClr val="accent1"/>
+              </a:effectRef>
+              <a:fontRef idx="minor">
+                <a:schemeClr val="tx1"/>
+              </a:fontRef>
+            </p:style>
+          </p:cxnSp>
+        </p:grpSp>
+        <p:cxnSp>
+          <p:nvCxnSpPr>
+            <p:cNvPr id="33" name="Straight Connector 32"/>
+            <p:cNvCxnSpPr/>
+            <p:nvPr/>
+          </p:nvCxnSpPr>
+          <p:spPr>
+            <a:xfrm>
+              <a:off x="3480915" y="5403693"/>
+              <a:ext cx="0" cy="486032"/>
+            </a:xfrm>
+            <a:prstGeom prst="line">
+              <a:avLst/>
+            </a:prstGeom>
+            <a:ln w="28575">
+              <a:solidFill>
+                <a:srgbClr val="FF0000"/>
+              </a:solidFill>
+              <a:headEnd type="triangle"/>
+            </a:ln>
+          </p:spPr>
+          <p:style>
+            <a:lnRef idx="1">
+              <a:schemeClr val="accent1"/>
+            </a:lnRef>
+            <a:fillRef idx="0">
+              <a:schemeClr val="accent1"/>
+            </a:fillRef>
+            <a:effectRef idx="0">
+              <a:schemeClr val="accent1"/>
+            </a:effectRef>
+            <a:fontRef idx="minor">
+              <a:schemeClr val="tx1"/>
+            </a:fontRef>
+          </p:style>
+        </p:cxnSp>
+        <p:cxnSp>
+          <p:nvCxnSpPr>
+            <p:cNvPr id="34" name="Straight Connector 33"/>
+            <p:cNvCxnSpPr/>
+            <p:nvPr/>
+          </p:nvCxnSpPr>
+          <p:spPr>
+            <a:xfrm>
+              <a:off x="3472677" y="5897963"/>
+              <a:ext cx="469557" cy="0"/>
+            </a:xfrm>
+            <a:prstGeom prst="line">
+              <a:avLst/>
+            </a:prstGeom>
+            <a:ln w="28575">
+              <a:solidFill>
+                <a:schemeClr val="accent6"/>
+              </a:solidFill>
+              <a:tailEnd type="triangle"/>
+            </a:ln>
+          </p:spPr>
+          <p:style>
+            <a:lnRef idx="1">
+              <a:schemeClr val="accent1"/>
+            </a:lnRef>
+            <a:fillRef idx="0">
+              <a:schemeClr val="accent1"/>
+            </a:fillRef>
+            <a:effectRef idx="0">
+              <a:schemeClr val="accent1"/>
+            </a:effectRef>
+            <a:fontRef idx="minor">
+              <a:schemeClr val="tx1"/>
+            </a:fontRef>
+          </p:style>
+        </p:cxnSp>
+        <p:grpSp>
+          <p:nvGrpSpPr>
+            <p:cNvPr id="38" name="Group 37"/>
+            <p:cNvGrpSpPr/>
+            <p:nvPr/>
+          </p:nvGrpSpPr>
+          <p:grpSpPr>
+            <a:xfrm>
+              <a:off x="4839641" y="1058386"/>
+              <a:ext cx="215213" cy="226540"/>
+              <a:chOff x="4444347" y="5974490"/>
+              <a:chExt cx="215213" cy="226540"/>
+            </a:xfrm>
+          </p:grpSpPr>
+          <p:cxnSp>
+            <p:nvCxnSpPr>
+              <p:cNvPr id="39" name="Straight Connector 38"/>
+              <p:cNvCxnSpPr/>
+              <p:nvPr/>
+            </p:nvCxnSpPr>
+            <p:spPr>
+              <a:xfrm>
+                <a:off x="4448123" y="5974490"/>
+                <a:ext cx="0" cy="222764"/>
+              </a:xfrm>
+              <a:prstGeom prst="line">
+                <a:avLst/>
+              </a:prstGeom>
+              <a:ln w="28575">
+                <a:solidFill>
+                  <a:srgbClr val="FF0000"/>
+                </a:solidFill>
+              </a:ln>
+            </p:spPr>
+            <p:style>
+              <a:lnRef idx="1">
+                <a:schemeClr val="accent1"/>
+              </a:lnRef>
+              <a:fillRef idx="0">
+                <a:schemeClr val="accent1"/>
+              </a:fillRef>
+              <a:effectRef idx="0">
+                <a:schemeClr val="accent1"/>
+              </a:effectRef>
+              <a:fontRef idx="minor">
+                <a:schemeClr val="tx1"/>
+              </a:fontRef>
+            </p:style>
+          </p:cxnSp>
+          <p:cxnSp>
+            <p:nvCxnSpPr>
+              <p:cNvPr id="40" name="Straight Connector 39"/>
+              <p:cNvCxnSpPr/>
+              <p:nvPr/>
+            </p:nvCxnSpPr>
+            <p:spPr>
+              <a:xfrm>
+                <a:off x="4444347" y="6201030"/>
+                <a:ext cx="215213" cy="0"/>
+              </a:xfrm>
+              <a:prstGeom prst="line">
+                <a:avLst/>
+              </a:prstGeom>
+              <a:ln w="28575">
+                <a:solidFill>
+                  <a:schemeClr val="accent6"/>
+                </a:solidFill>
+              </a:ln>
+            </p:spPr>
+            <p:style>
+              <a:lnRef idx="1">
+                <a:schemeClr val="accent1"/>
+              </a:lnRef>
+              <a:fillRef idx="0">
+                <a:schemeClr val="accent1"/>
+              </a:fillRef>
+              <a:effectRef idx="0">
+                <a:schemeClr val="accent1"/>
+              </a:effectRef>
+              <a:fontRef idx="minor">
+                <a:schemeClr val="tx1"/>
+              </a:fontRef>
+            </p:style>
+          </p:cxnSp>
+        </p:grpSp>
+        <p:sp>
+          <p:nvSpPr>
+            <p:cNvPr id="41" name="TextBox 40"/>
+            <p:cNvSpPr txBox="1"/>
+            <p:nvPr/>
+          </p:nvSpPr>
+          <p:spPr>
+            <a:xfrm>
+              <a:off x="5206655" y="952092"/>
+              <a:ext cx="1458098" cy="600164"/>
+            </a:xfrm>
+            <a:prstGeom prst="rect">
+              <a:avLst/>
+            </a:prstGeom>
+            <a:noFill/>
+          </p:spPr>
+          <p:txBody>
+            <a:bodyPr wrap="square" rtlCol="0">
+              <a:spAutoFit/>
+            </a:bodyPr>
+            <a:lstStyle/>
+            <a:p>
+              <a:pPr algn="ctr"/>
+              <a:r>
+                <a:rPr lang="en-US" sz="1100" dirty="0" err="1" smtClean="0"/>
+                <a:t>waist_yaw</a:t>
+              </a:r>
+              <a:endParaRPr lang="en-US" sz="1100" dirty="0" smtClean="0"/>
+            </a:p>
+            <a:p>
+              <a:pPr algn="ctr"/>
+              <a:r>
+                <a:rPr lang="en-US" sz="1100" dirty="0" err="1" smtClean="0"/>
+                <a:t>waist_pitch</a:t>
+              </a:r>
+              <a:endParaRPr lang="en-US" sz="1100" dirty="0" smtClean="0"/>
+            </a:p>
+            <a:p>
+              <a:pPr algn="ctr"/>
+              <a:r>
+                <a:rPr lang="en-US" sz="1100" dirty="0" smtClean="0"/>
+                <a:t>(co-located)</a:t>
+              </a:r>
+              <a:endParaRPr lang="en-US" sz="1100" dirty="0"/>
+            </a:p>
+          </p:txBody>
+        </p:sp>
+        <p:sp>
+          <p:nvSpPr>
+            <p:cNvPr id="42" name="TextBox 41"/>
+            <p:cNvSpPr txBox="1"/>
+            <p:nvPr/>
+          </p:nvSpPr>
+          <p:spPr>
+            <a:xfrm>
+              <a:off x="5206655" y="2323125"/>
+              <a:ext cx="1458098" cy="769441"/>
+            </a:xfrm>
+            <a:prstGeom prst="rect">
+              <a:avLst/>
+            </a:prstGeom>
+            <a:noFill/>
+          </p:spPr>
+          <p:txBody>
+            <a:bodyPr wrap="square" rtlCol="0">
+              <a:spAutoFit/>
+            </a:bodyPr>
+            <a:lstStyle/>
+            <a:p>
+              <a:pPr algn="ctr"/>
+              <a:r>
+                <a:rPr lang="en-US" sz="1100" dirty="0" err="1" smtClean="0"/>
+                <a:t>hip_yaw</a:t>
+              </a:r>
+              <a:endParaRPr lang="en-US" sz="1100" dirty="0" smtClean="0"/>
+            </a:p>
+            <a:p>
+              <a:pPr algn="ctr"/>
+              <a:r>
+                <a:rPr lang="en-US" sz="1100" dirty="0" err="1" smtClean="0"/>
+                <a:t>hip_roll</a:t>
+              </a:r>
+              <a:endParaRPr lang="en-US" sz="1100" dirty="0" smtClean="0"/>
+            </a:p>
+            <a:p>
+              <a:pPr algn="ctr"/>
+              <a:r>
+                <a:rPr lang="en-US" sz="1100" dirty="0" err="1" smtClean="0"/>
+                <a:t>hip_pitch</a:t>
+              </a:r>
+              <a:endParaRPr lang="en-US" sz="1100" dirty="0" smtClean="0"/>
+            </a:p>
+            <a:p>
+              <a:pPr algn="ctr"/>
+              <a:r>
+                <a:rPr lang="en-US" sz="1100" dirty="0" smtClean="0"/>
+                <a:t>(co-located)</a:t>
+              </a:r>
+              <a:endParaRPr lang="en-US" sz="1100" dirty="0"/>
+            </a:p>
+          </p:txBody>
+        </p:sp>
+        <p:sp>
+          <p:nvSpPr>
+            <p:cNvPr id="43" name="TextBox 42"/>
+            <p:cNvSpPr txBox="1"/>
+            <p:nvPr/>
+          </p:nvSpPr>
+          <p:spPr>
+            <a:xfrm>
+              <a:off x="5206655" y="3998415"/>
+              <a:ext cx="1458098" cy="261610"/>
+            </a:xfrm>
+            <a:prstGeom prst="rect">
+              <a:avLst/>
+            </a:prstGeom>
+            <a:noFill/>
+          </p:spPr>
+          <p:txBody>
+            <a:bodyPr wrap="square" rtlCol="0">
+              <a:spAutoFit/>
+            </a:bodyPr>
+            <a:lstStyle/>
+            <a:p>
+              <a:pPr algn="ctr"/>
+              <a:r>
+                <a:rPr lang="en-US" sz="1100" dirty="0" err="1" smtClean="0"/>
+                <a:t>knee_pitch</a:t>
+              </a:r>
+              <a:endParaRPr lang="en-US" sz="1100" dirty="0"/>
+            </a:p>
+          </p:txBody>
+        </p:sp>
+        <p:sp>
+          <p:nvSpPr>
+            <p:cNvPr id="44" name="TextBox 43"/>
+            <p:cNvSpPr txBox="1"/>
+            <p:nvPr/>
+          </p:nvSpPr>
+          <p:spPr>
+            <a:xfrm>
+              <a:off x="5206655" y="5431265"/>
+              <a:ext cx="1458098" cy="600164"/>
+            </a:xfrm>
+            <a:prstGeom prst="rect">
+              <a:avLst/>
+            </a:prstGeom>
+            <a:noFill/>
+          </p:spPr>
+          <p:txBody>
+            <a:bodyPr wrap="square" rtlCol="0">
+              <a:spAutoFit/>
+            </a:bodyPr>
+            <a:lstStyle/>
+            <a:p>
+              <a:pPr algn="ctr"/>
+              <a:r>
+                <a:rPr lang="en-US" sz="1100" dirty="0" err="1" smtClean="0"/>
+                <a:t>ankle_pitch</a:t>
+              </a:r>
+              <a:endParaRPr lang="en-US" sz="1100" dirty="0" smtClean="0"/>
+            </a:p>
+            <a:p>
+              <a:pPr algn="ctr"/>
+              <a:r>
+                <a:rPr lang="en-US" sz="1100" dirty="0" err="1" smtClean="0"/>
+                <a:t>ankle_roll</a:t>
+              </a:r>
+              <a:endParaRPr lang="en-US" sz="1100" dirty="0" smtClean="0"/>
+            </a:p>
+            <a:p>
+              <a:pPr algn="ctr"/>
+              <a:r>
+                <a:rPr lang="en-US" sz="1100" dirty="0" smtClean="0"/>
+                <a:t>(co-located)</a:t>
+              </a:r>
+              <a:endParaRPr lang="en-US" sz="1100" dirty="0"/>
+            </a:p>
+          </p:txBody>
+        </p:sp>
+        <p:sp>
+          <p:nvSpPr>
+            <p:cNvPr id="45" name="TextBox 44"/>
+            <p:cNvSpPr txBox="1"/>
+            <p:nvPr/>
+          </p:nvSpPr>
+          <p:spPr>
+            <a:xfrm>
+              <a:off x="3357632" y="5061933"/>
+              <a:ext cx="313037" cy="369332"/>
+            </a:xfrm>
+            <a:prstGeom prst="rect">
+              <a:avLst/>
+            </a:prstGeom>
+            <a:noFill/>
+          </p:spPr>
+          <p:txBody>
+            <a:bodyPr wrap="square" rtlCol="0">
+              <a:spAutoFit/>
+            </a:bodyPr>
+            <a:lstStyle/>
+            <a:p>
+              <a:r>
+                <a:rPr lang="en-US" dirty="0" smtClean="0"/>
+                <a:t>Z</a:t>
+              </a:r>
+              <a:endParaRPr lang="en-US" dirty="0"/>
+            </a:p>
+          </p:txBody>
+        </p:sp>
+        <p:sp>
+          <p:nvSpPr>
+            <p:cNvPr id="46" name="TextBox 45"/>
+            <p:cNvSpPr txBox="1"/>
+            <p:nvPr/>
+          </p:nvSpPr>
+          <p:spPr>
+            <a:xfrm>
+              <a:off x="3938645" y="5713297"/>
+              <a:ext cx="313037" cy="369332"/>
+            </a:xfrm>
+            <a:prstGeom prst="rect">
+              <a:avLst/>
+            </a:prstGeom>
+            <a:noFill/>
+          </p:spPr>
+          <p:txBody>
+            <a:bodyPr wrap="square" rtlCol="0">
+              <a:spAutoFit/>
+            </a:bodyPr>
+            <a:lstStyle/>
+            <a:p>
+              <a:r>
+                <a:rPr lang="en-US" dirty="0" smtClean="0"/>
+                <a:t>X</a:t>
+              </a:r>
+              <a:endParaRPr lang="en-US" dirty="0"/>
+            </a:p>
+          </p:txBody>
+        </p:sp>
+        <p:sp>
+          <p:nvSpPr>
+            <p:cNvPr id="47" name="TextBox 46"/>
+            <p:cNvSpPr txBox="1"/>
+            <p:nvPr/>
+          </p:nvSpPr>
+          <p:spPr>
+            <a:xfrm>
+              <a:off x="8279693" y="5093168"/>
+              <a:ext cx="313037" cy="369332"/>
+            </a:xfrm>
+            <a:prstGeom prst="rect">
+              <a:avLst/>
+            </a:prstGeom>
+            <a:noFill/>
+          </p:spPr>
+          <p:txBody>
+            <a:bodyPr wrap="square" rtlCol="0">
+              <a:spAutoFit/>
+            </a:bodyPr>
+            <a:lstStyle/>
+            <a:p>
+              <a:r>
+                <a:rPr lang="en-US" dirty="0" smtClean="0"/>
+                <a:t>Z</a:t>
+              </a:r>
+              <a:endParaRPr lang="en-US" dirty="0"/>
+            </a:p>
+          </p:txBody>
+        </p:sp>
+        <p:sp>
+          <p:nvSpPr>
+            <p:cNvPr id="48" name="TextBox 47"/>
+            <p:cNvSpPr txBox="1"/>
+            <p:nvPr/>
+          </p:nvSpPr>
+          <p:spPr>
+            <a:xfrm>
+              <a:off x="8855669" y="5705059"/>
+              <a:ext cx="313037" cy="369332"/>
+            </a:xfrm>
+            <a:prstGeom prst="rect">
+              <a:avLst/>
+            </a:prstGeom>
+            <a:noFill/>
+          </p:spPr>
+          <p:txBody>
+            <a:bodyPr wrap="square" rtlCol="0">
+              <a:spAutoFit/>
+            </a:bodyPr>
+            <a:lstStyle/>
+            <a:p>
+              <a:r>
+                <a:rPr lang="en-US" dirty="0" smtClean="0"/>
+                <a:t>Y</a:t>
+              </a:r>
+              <a:endParaRPr lang="en-US" dirty="0"/>
+            </a:p>
+          </p:txBody>
+        </p:sp>
+        <p:sp>
+          <p:nvSpPr>
+            <p:cNvPr id="53" name="TextBox 52"/>
+            <p:cNvSpPr txBox="1"/>
+            <p:nvPr/>
+          </p:nvSpPr>
+          <p:spPr>
+            <a:xfrm>
+              <a:off x="3782292" y="6216095"/>
+              <a:ext cx="4306824" cy="215444"/>
+            </a:xfrm>
+            <a:prstGeom prst="rect">
+              <a:avLst/>
+            </a:prstGeom>
+            <a:noFill/>
+          </p:spPr>
+          <p:txBody>
+            <a:bodyPr wrap="square" rtlCol="0">
+              <a:spAutoFit/>
+            </a:bodyPr>
+            <a:lstStyle/>
+            <a:p>
+              <a:pPr algn="ctr"/>
+              <a:r>
+                <a:rPr lang="en-US" sz="800" dirty="0" smtClean="0"/>
+                <a:t>Symmetric joints will be differentiated by a “r_” or “l_” prefix for “right” and “left”</a:t>
+              </a:r>
+              <a:endParaRPr lang="en-US" sz="800" dirty="0"/>
+            </a:p>
+          </p:txBody>
+        </p:sp>
+      </p:grpSp>
+    </p:spTree>
+    <p:extLst>
+      <p:ext uri="{BB962C8B-B14F-4D97-AF65-F5344CB8AC3E}">
+        <p14:creationId xmlns:p14="http://schemas.microsoft.com/office/powerpoint/2010/main" val="1951150720"/>
+      </p:ext>
+    </p:extLst>
+  </p:cSld>
+  <p:clrMapOvr>
+    <a:masterClrMapping/>
+  </p:clrMapOvr>
+</p:sld>
+</file>
+
+<file path=ppt/slides/slide5.xml><?xml version="1.0" encoding="utf-8"?>
+<p:sld xmlns:a="http://schemas.openxmlformats.org/drawingml/2006/main" xmlns:r="http://schemas.openxmlformats.org/officeDocument/2006/relationships" xmlns:p="http://schemas.openxmlformats.org/presentationml/2006/main">
+  <p:cSld>
+    <p:spTree>
+      <p:nvGrpSpPr>
+        <p:cNvPr id="1" name=""/>
+        <p:cNvGrpSpPr/>
+        <p:nvPr/>
+      </p:nvGrpSpPr>
+      <p:grpSpPr>
+        <a:xfrm>
+          <a:off x="0" y="0"/>
+          <a:ext cx="0" cy="0"/>
+          <a:chOff x="0" y="0"/>
+          <a:chExt cx="0" cy="0"/>
+        </a:xfrm>
+      </p:grpSpPr>
+      <p:grpSp>
+        <p:nvGrpSpPr>
+          <p:cNvPr id="50" name="Group 49"/>
+          <p:cNvGrpSpPr/>
+          <p:nvPr/>
+        </p:nvGrpSpPr>
+        <p:grpSpPr>
+          <a:xfrm>
+            <a:off x="2365903" y="1016100"/>
+            <a:ext cx="7219135" cy="4666932"/>
+            <a:chOff x="2365903" y="1016100"/>
+            <a:chExt cx="7219135" cy="4666932"/>
+          </a:xfrm>
+        </p:grpSpPr>
+        <p:pic>
+          <p:nvPicPr>
+            <p:cNvPr id="19" name="Picture 18"/>
+            <p:cNvPicPr>
+              <a:picLocks noChangeAspect="1"/>
+            </p:cNvPicPr>
+            <p:nvPr/>
+          </p:nvPicPr>
+          <p:blipFill rotWithShape="1">
+            <a:blip r:embed="rId2" cstate="print">
+              <a:extLst>
+                <a:ext uri="{28A0092B-C50C-407E-A947-70E740481C1C}">
+                  <a14:useLocalDpi xmlns:a14="http://schemas.microsoft.com/office/drawing/2010/main" val="0"/>
+                </a:ext>
+              </a:extLst>
+            </a:blip>
+            <a:srcRect b="38549"/>
+            <a:stretch/>
+          </p:blipFill>
+          <p:spPr>
+            <a:xfrm>
+              <a:off x="2365903" y="1016100"/>
+              <a:ext cx="4219903" cy="4214268"/>
+            </a:xfrm>
+            <a:prstGeom prst="rect">
+              <a:avLst/>
+            </a:prstGeom>
+          </p:spPr>
+        </p:pic>
+        <p:pic>
+          <p:nvPicPr>
+            <p:cNvPr id="20" name="Picture 19"/>
+            <p:cNvPicPr>
+              <a:picLocks noChangeAspect="1"/>
+            </p:cNvPicPr>
+            <p:nvPr/>
+          </p:nvPicPr>
+          <p:blipFill rotWithShape="1">
+            <a:blip r:embed="rId3" cstate="print">
+              <a:extLst>
+                <a:ext uri="{28A0092B-C50C-407E-A947-70E740481C1C}">
+                  <a14:useLocalDpi xmlns:a14="http://schemas.microsoft.com/office/drawing/2010/main" val="0"/>
+                </a:ext>
+              </a:extLst>
+            </a:blip>
+            <a:srcRect b="40550"/>
+            <a:stretch/>
+          </p:blipFill>
+          <p:spPr>
+            <a:xfrm>
+              <a:off x="5365135" y="1016100"/>
+              <a:ext cx="4219903" cy="4077108"/>
+            </a:xfrm>
+            <a:prstGeom prst="rect">
+              <a:avLst/>
+            </a:prstGeom>
+          </p:spPr>
+        </p:pic>
+        <p:cxnSp>
+          <p:nvCxnSpPr>
+            <p:cNvPr id="4" name="Straight Connector 3"/>
+            <p:cNvCxnSpPr/>
+            <p:nvPr/>
+          </p:nvCxnSpPr>
+          <p:spPr>
+            <a:xfrm>
+              <a:off x="2980625" y="4660337"/>
+              <a:ext cx="0" cy="486032"/>
+            </a:xfrm>
+            <a:prstGeom prst="line">
+              <a:avLst/>
+            </a:prstGeom>
+            <a:ln w="28575">
+              <a:solidFill>
+                <a:srgbClr val="FF0000"/>
+              </a:solidFill>
+              <a:headEnd type="triangle"/>
+            </a:ln>
+          </p:spPr>
+          <p:style>
+            <a:lnRef idx="1">
+              <a:schemeClr val="accent1"/>
+            </a:lnRef>
+            <a:fillRef idx="0">
+              <a:schemeClr val="accent1"/>
+            </a:fillRef>
+            <a:effectRef idx="0">
+              <a:schemeClr val="accent1"/>
+            </a:effectRef>
+            <a:fontRef idx="minor">
+              <a:schemeClr val="tx1"/>
+            </a:fontRef>
+          </p:style>
+        </p:cxnSp>
+        <p:cxnSp>
+          <p:nvCxnSpPr>
+            <p:cNvPr id="5" name="Straight Connector 4"/>
+            <p:cNvCxnSpPr/>
+            <p:nvPr/>
+          </p:nvCxnSpPr>
+          <p:spPr>
+            <a:xfrm>
+              <a:off x="2972387" y="5154607"/>
+              <a:ext cx="469557" cy="0"/>
+            </a:xfrm>
+            <a:prstGeom prst="line">
+              <a:avLst/>
+            </a:prstGeom>
+            <a:ln w="28575">
+              <a:solidFill>
+                <a:schemeClr val="accent1">
+                  <a:lumMod val="75000"/>
+                </a:schemeClr>
+              </a:solidFill>
+              <a:headEnd type="none"/>
+              <a:tailEnd type="triangle"/>
+            </a:ln>
+          </p:spPr>
+          <p:style>
+            <a:lnRef idx="1">
+              <a:schemeClr val="accent1"/>
+            </a:lnRef>
+            <a:fillRef idx="0">
+              <a:schemeClr val="accent1"/>
+            </a:fillRef>
+            <a:effectRef idx="0">
+              <a:schemeClr val="accent1"/>
+            </a:effectRef>
+            <a:fontRef idx="minor">
+              <a:schemeClr val="tx1"/>
+            </a:fontRef>
+          </p:style>
+        </p:cxnSp>
+        <p:grpSp>
+          <p:nvGrpSpPr>
+            <p:cNvPr id="6" name="Group 5"/>
+            <p:cNvGrpSpPr/>
+            <p:nvPr/>
+          </p:nvGrpSpPr>
+          <p:grpSpPr>
+            <a:xfrm>
+              <a:off x="4543977" y="1571227"/>
+              <a:ext cx="215213" cy="226540"/>
+              <a:chOff x="6157784" y="5960076"/>
+              <a:chExt cx="469557" cy="494270"/>
+            </a:xfrm>
+          </p:grpSpPr>
+          <p:cxnSp>
+            <p:nvCxnSpPr>
+              <p:cNvPr id="7" name="Straight Connector 6"/>
+              <p:cNvCxnSpPr/>
+              <p:nvPr/>
+            </p:nvCxnSpPr>
+            <p:spPr>
+              <a:xfrm>
+                <a:off x="6166022" y="5960076"/>
+                <a:ext cx="0" cy="486032"/>
+              </a:xfrm>
+              <a:prstGeom prst="line">
+                <a:avLst/>
+              </a:prstGeom>
+              <a:ln w="28575">
+                <a:solidFill>
+                  <a:srgbClr val="FF0000"/>
+                </a:solidFill>
+              </a:ln>
+            </p:spPr>
+            <p:style>
+              <a:lnRef idx="1">
+                <a:schemeClr val="accent1"/>
+              </a:lnRef>
+              <a:fillRef idx="0">
+                <a:schemeClr val="accent1"/>
+              </a:fillRef>
+              <a:effectRef idx="0">
+                <a:schemeClr val="accent1"/>
+              </a:effectRef>
+              <a:fontRef idx="minor">
+                <a:schemeClr val="tx1"/>
+              </a:fontRef>
+            </p:style>
+          </p:cxnSp>
+          <p:cxnSp>
+            <p:nvCxnSpPr>
+              <p:cNvPr id="8" name="Straight Connector 7"/>
+              <p:cNvCxnSpPr/>
+              <p:nvPr/>
+            </p:nvCxnSpPr>
+            <p:spPr>
+              <a:xfrm>
+                <a:off x="6157784" y="6454346"/>
+                <a:ext cx="469557" cy="0"/>
+              </a:xfrm>
+              <a:prstGeom prst="line">
+                <a:avLst/>
+              </a:prstGeom>
+              <a:ln w="28575">
+                <a:solidFill>
+                  <a:schemeClr val="accent1">
+                    <a:lumMod val="75000"/>
+                  </a:schemeClr>
+                </a:solidFill>
+              </a:ln>
+            </p:spPr>
+            <p:style>
+              <a:lnRef idx="1">
+                <a:schemeClr val="accent1"/>
+              </a:lnRef>
+              <a:fillRef idx="0">
+                <a:schemeClr val="accent1"/>
+              </a:fillRef>
+              <a:effectRef idx="0">
+                <a:schemeClr val="accent1"/>
+              </a:effectRef>
+              <a:fontRef idx="minor">
+                <a:schemeClr val="tx1"/>
+              </a:fontRef>
+            </p:style>
+          </p:cxnSp>
+        </p:grpSp>
+        <p:cxnSp>
+          <p:nvCxnSpPr>
+            <p:cNvPr id="9" name="Straight Connector 8"/>
+            <p:cNvCxnSpPr/>
+            <p:nvPr/>
+          </p:nvCxnSpPr>
+          <p:spPr>
+            <a:xfrm flipH="1">
+              <a:off x="8667287" y="4661326"/>
+              <a:ext cx="0" cy="486032"/>
+            </a:xfrm>
+            <a:prstGeom prst="line">
+              <a:avLst/>
+            </a:prstGeom>
+            <a:ln w="28575">
+              <a:solidFill>
+                <a:srgbClr val="FF0000"/>
+              </a:solidFill>
+              <a:headEnd type="triangle"/>
+            </a:ln>
+          </p:spPr>
+          <p:style>
+            <a:lnRef idx="1">
+              <a:schemeClr val="accent1"/>
+            </a:lnRef>
+            <a:fillRef idx="0">
+              <a:schemeClr val="accent1"/>
+            </a:fillRef>
+            <a:effectRef idx="0">
+              <a:schemeClr val="accent1"/>
+            </a:effectRef>
+            <a:fontRef idx="minor">
+              <a:schemeClr val="tx1"/>
+            </a:fontRef>
+          </p:style>
+        </p:cxnSp>
+        <p:cxnSp>
+          <p:nvCxnSpPr>
+            <p:cNvPr id="10" name="Straight Connector 9"/>
+            <p:cNvCxnSpPr/>
+            <p:nvPr/>
+          </p:nvCxnSpPr>
+          <p:spPr>
+            <a:xfrm flipH="1">
+              <a:off x="8201849" y="5155596"/>
+              <a:ext cx="469557" cy="0"/>
+            </a:xfrm>
+            <a:prstGeom prst="line">
+              <a:avLst/>
+            </a:prstGeom>
+            <a:ln w="28575">
+              <a:solidFill>
+                <a:schemeClr val="accent6"/>
+              </a:solidFill>
+              <a:tailEnd type="triangle"/>
+            </a:ln>
+          </p:spPr>
+          <p:style>
+            <a:lnRef idx="1">
+              <a:schemeClr val="accent1"/>
+            </a:lnRef>
+            <a:fillRef idx="0">
+              <a:schemeClr val="accent1"/>
+            </a:fillRef>
+            <a:effectRef idx="0">
+              <a:schemeClr val="accent1"/>
+            </a:effectRef>
+            <a:fontRef idx="minor">
+              <a:schemeClr val="tx1"/>
+            </a:fontRef>
+          </p:style>
+        </p:cxnSp>
+        <p:grpSp>
+          <p:nvGrpSpPr>
+            <p:cNvPr id="11" name="Group 10"/>
+            <p:cNvGrpSpPr/>
+            <p:nvPr/>
+          </p:nvGrpSpPr>
+          <p:grpSpPr>
+            <a:xfrm flipH="1">
+              <a:off x="7542003" y="1575003"/>
+              <a:ext cx="215213" cy="226540"/>
+              <a:chOff x="4444347" y="5974490"/>
+              <a:chExt cx="215213" cy="226540"/>
+            </a:xfrm>
+          </p:grpSpPr>
+          <p:cxnSp>
+            <p:nvCxnSpPr>
+              <p:cNvPr id="12" name="Straight Connector 11"/>
+              <p:cNvCxnSpPr/>
+              <p:nvPr/>
+            </p:nvCxnSpPr>
+            <p:spPr>
+              <a:xfrm>
+                <a:off x="4448123" y="5974490"/>
+                <a:ext cx="0" cy="222764"/>
+              </a:xfrm>
+              <a:prstGeom prst="line">
+                <a:avLst/>
+              </a:prstGeom>
+              <a:ln w="28575">
+                <a:solidFill>
+                  <a:srgbClr val="FF0000"/>
+                </a:solidFill>
+              </a:ln>
+            </p:spPr>
+            <p:style>
+              <a:lnRef idx="1">
+                <a:schemeClr val="accent1"/>
+              </a:lnRef>
+              <a:fillRef idx="0">
+                <a:schemeClr val="accent1"/>
+              </a:fillRef>
+              <a:effectRef idx="0">
+                <a:schemeClr val="accent1"/>
+              </a:effectRef>
+              <a:fontRef idx="minor">
+                <a:schemeClr val="tx1"/>
+              </a:fontRef>
+            </p:style>
+          </p:cxnSp>
+          <p:cxnSp>
+            <p:nvCxnSpPr>
+              <p:cNvPr id="13" name="Straight Connector 12"/>
+              <p:cNvCxnSpPr/>
+              <p:nvPr/>
+            </p:nvCxnSpPr>
+            <p:spPr>
+              <a:xfrm>
+                <a:off x="4444347" y="6201030"/>
+                <a:ext cx="215213" cy="0"/>
+              </a:xfrm>
+              <a:prstGeom prst="line">
+                <a:avLst/>
+              </a:prstGeom>
+              <a:ln w="28575">
+                <a:solidFill>
+                  <a:schemeClr val="accent6"/>
+                </a:solidFill>
+              </a:ln>
+            </p:spPr>
+            <p:style>
+              <a:lnRef idx="1">
+                <a:schemeClr val="accent1"/>
+              </a:lnRef>
+              <a:fillRef idx="0">
+                <a:schemeClr val="accent1"/>
+              </a:fillRef>
+              <a:effectRef idx="0">
+                <a:schemeClr val="accent1"/>
+              </a:effectRef>
+              <a:fontRef idx="minor">
+                <a:schemeClr val="tx1"/>
+              </a:fontRef>
+            </p:style>
+          </p:cxnSp>
+        </p:grpSp>
+        <p:sp>
+          <p:nvSpPr>
+            <p:cNvPr id="14" name="TextBox 13"/>
+            <p:cNvSpPr txBox="1"/>
+            <p:nvPr/>
+          </p:nvSpPr>
+          <p:spPr>
+            <a:xfrm>
+              <a:off x="5779409" y="1568714"/>
+              <a:ext cx="1458098" cy="261610"/>
+            </a:xfrm>
+            <a:prstGeom prst="rect">
+              <a:avLst/>
+            </a:prstGeom>
+            <a:noFill/>
+          </p:spPr>
+          <p:txBody>
+            <a:bodyPr wrap="square" rtlCol="0">
+              <a:spAutoFit/>
+            </a:bodyPr>
+            <a:lstStyle/>
+            <a:p>
+              <a:pPr algn="ctr"/>
+              <a:r>
+                <a:rPr lang="en-US" sz="1100" dirty="0" err="1" smtClean="0"/>
+                <a:t>head_pitch</a:t>
+              </a:r>
+              <a:endParaRPr lang="en-US" sz="1100" dirty="0"/>
+            </a:p>
+          </p:txBody>
+        </p:sp>
+        <p:sp>
+          <p:nvSpPr>
+            <p:cNvPr id="15" name="TextBox 14"/>
+            <p:cNvSpPr txBox="1"/>
+            <p:nvPr/>
+          </p:nvSpPr>
+          <p:spPr>
+            <a:xfrm>
+              <a:off x="8544004" y="4319566"/>
+              <a:ext cx="313037" cy="369332"/>
+            </a:xfrm>
+            <a:prstGeom prst="rect">
+              <a:avLst/>
+            </a:prstGeom>
+            <a:noFill/>
+          </p:spPr>
+          <p:txBody>
+            <a:bodyPr wrap="square" rtlCol="0">
+              <a:spAutoFit/>
+            </a:bodyPr>
+            <a:lstStyle/>
+            <a:p>
+              <a:r>
+                <a:rPr lang="en-US" dirty="0" smtClean="0"/>
+                <a:t>Z</a:t>
+              </a:r>
+              <a:endParaRPr lang="en-US" dirty="0"/>
+            </a:p>
+          </p:txBody>
+        </p:sp>
+        <p:sp>
+          <p:nvSpPr>
+            <p:cNvPr id="16" name="TextBox 15"/>
+            <p:cNvSpPr txBox="1"/>
+            <p:nvPr/>
+          </p:nvSpPr>
+          <p:spPr>
+            <a:xfrm flipH="1">
+              <a:off x="7928903" y="4961786"/>
+              <a:ext cx="313037" cy="369332"/>
+            </a:xfrm>
+            <a:prstGeom prst="rect">
+              <a:avLst/>
+            </a:prstGeom>
+            <a:noFill/>
+          </p:spPr>
+          <p:txBody>
+            <a:bodyPr wrap="square" rtlCol="0">
+              <a:spAutoFit/>
+            </a:bodyPr>
+            <a:lstStyle/>
+            <a:p>
+              <a:r>
+                <a:rPr lang="en-US" dirty="0" smtClean="0"/>
+                <a:t>X</a:t>
+              </a:r>
+              <a:endParaRPr lang="en-US" dirty="0"/>
+            </a:p>
+          </p:txBody>
+        </p:sp>
+        <p:sp>
+          <p:nvSpPr>
+            <p:cNvPr id="17" name="TextBox 16"/>
+            <p:cNvSpPr txBox="1"/>
+            <p:nvPr/>
+          </p:nvSpPr>
+          <p:spPr>
+            <a:xfrm>
+              <a:off x="2845037" y="4349812"/>
+              <a:ext cx="313037" cy="369332"/>
+            </a:xfrm>
+            <a:prstGeom prst="rect">
+              <a:avLst/>
+            </a:prstGeom>
+            <a:noFill/>
+          </p:spPr>
+          <p:txBody>
+            <a:bodyPr wrap="square" rtlCol="0">
+              <a:spAutoFit/>
+            </a:bodyPr>
+            <a:lstStyle/>
+            <a:p>
+              <a:r>
+                <a:rPr lang="en-US" dirty="0" smtClean="0"/>
+                <a:t>Z</a:t>
+              </a:r>
+              <a:endParaRPr lang="en-US" dirty="0"/>
+            </a:p>
+          </p:txBody>
+        </p:sp>
+        <p:sp>
+          <p:nvSpPr>
+            <p:cNvPr id="18" name="TextBox 17"/>
+            <p:cNvSpPr txBox="1"/>
+            <p:nvPr/>
+          </p:nvSpPr>
+          <p:spPr>
+            <a:xfrm>
+              <a:off x="3421013" y="4961703"/>
+              <a:ext cx="313037" cy="369332"/>
+            </a:xfrm>
+            <a:prstGeom prst="rect">
+              <a:avLst/>
+            </a:prstGeom>
+            <a:noFill/>
+          </p:spPr>
+          <p:txBody>
+            <a:bodyPr wrap="square" rtlCol="0">
+              <a:spAutoFit/>
+            </a:bodyPr>
+            <a:lstStyle/>
+            <a:p>
+              <a:r>
+                <a:rPr lang="en-US" dirty="0" smtClean="0"/>
+                <a:t>Y</a:t>
+              </a:r>
+              <a:endParaRPr lang="en-US" dirty="0"/>
+            </a:p>
+          </p:txBody>
+        </p:sp>
+        <p:grpSp>
+          <p:nvGrpSpPr>
+            <p:cNvPr id="21" name="Group 20"/>
+            <p:cNvGrpSpPr/>
+            <p:nvPr/>
+          </p:nvGrpSpPr>
+          <p:grpSpPr>
+            <a:xfrm flipH="1">
+              <a:off x="7600113" y="2221257"/>
+              <a:ext cx="215213" cy="226540"/>
+              <a:chOff x="4444347" y="5974490"/>
+              <a:chExt cx="215213" cy="226540"/>
+            </a:xfrm>
+          </p:grpSpPr>
+          <p:cxnSp>
+            <p:nvCxnSpPr>
+              <p:cNvPr id="22" name="Straight Connector 21"/>
+              <p:cNvCxnSpPr/>
+              <p:nvPr/>
+            </p:nvCxnSpPr>
+            <p:spPr>
+              <a:xfrm>
+                <a:off x="4448123" y="5974490"/>
+                <a:ext cx="0" cy="222764"/>
+              </a:xfrm>
+              <a:prstGeom prst="line">
+                <a:avLst/>
+              </a:prstGeom>
+              <a:ln w="28575">
+                <a:solidFill>
+                  <a:srgbClr val="FF0000"/>
+                </a:solidFill>
+              </a:ln>
+            </p:spPr>
+            <p:style>
+              <a:lnRef idx="1">
+                <a:schemeClr val="accent1"/>
+              </a:lnRef>
+              <a:fillRef idx="0">
+                <a:schemeClr val="accent1"/>
+              </a:fillRef>
+              <a:effectRef idx="0">
+                <a:schemeClr val="accent1"/>
+              </a:effectRef>
+              <a:fontRef idx="minor">
+                <a:schemeClr val="tx1"/>
+              </a:fontRef>
+            </p:style>
+          </p:cxnSp>
+          <p:cxnSp>
+            <p:nvCxnSpPr>
+              <p:cNvPr id="23" name="Straight Connector 22"/>
+              <p:cNvCxnSpPr/>
+              <p:nvPr/>
+            </p:nvCxnSpPr>
+            <p:spPr>
+              <a:xfrm>
+                <a:off x="4444347" y="6201030"/>
+                <a:ext cx="215213" cy="0"/>
+              </a:xfrm>
+              <a:prstGeom prst="line">
+                <a:avLst/>
+              </a:prstGeom>
+              <a:ln w="28575">
+                <a:solidFill>
+                  <a:schemeClr val="accent6"/>
+                </a:solidFill>
+              </a:ln>
+            </p:spPr>
+            <p:style>
+              <a:lnRef idx="1">
+                <a:schemeClr val="accent1"/>
+              </a:lnRef>
+              <a:fillRef idx="0">
+                <a:schemeClr val="accent1"/>
+              </a:fillRef>
+              <a:effectRef idx="0">
+                <a:schemeClr val="accent1"/>
+              </a:effectRef>
+              <a:fontRef idx="minor">
+                <a:schemeClr val="tx1"/>
+              </a:fontRef>
+            </p:style>
+          </p:cxnSp>
+        </p:grpSp>
+        <p:grpSp>
+          <p:nvGrpSpPr>
+            <p:cNvPr id="24" name="Group 23"/>
+            <p:cNvGrpSpPr/>
+            <p:nvPr/>
+          </p:nvGrpSpPr>
+          <p:grpSpPr>
+            <a:xfrm flipH="1">
+              <a:off x="7461828" y="3185463"/>
+              <a:ext cx="215213" cy="226540"/>
+              <a:chOff x="4444347" y="5974490"/>
+              <a:chExt cx="215213" cy="226540"/>
+            </a:xfrm>
+          </p:grpSpPr>
+          <p:cxnSp>
+            <p:nvCxnSpPr>
+              <p:cNvPr id="25" name="Straight Connector 24"/>
+              <p:cNvCxnSpPr/>
+              <p:nvPr/>
+            </p:nvCxnSpPr>
+            <p:spPr>
+              <a:xfrm>
+                <a:off x="4448123" y="5974490"/>
+                <a:ext cx="0" cy="222764"/>
+              </a:xfrm>
+              <a:prstGeom prst="line">
+                <a:avLst/>
+              </a:prstGeom>
+              <a:ln w="28575">
+                <a:solidFill>
+                  <a:srgbClr val="FF0000"/>
+                </a:solidFill>
+              </a:ln>
+            </p:spPr>
+            <p:style>
+              <a:lnRef idx="1">
+                <a:schemeClr val="accent1"/>
+              </a:lnRef>
+              <a:fillRef idx="0">
+                <a:schemeClr val="accent1"/>
+              </a:fillRef>
+              <a:effectRef idx="0">
+                <a:schemeClr val="accent1"/>
+              </a:effectRef>
+              <a:fontRef idx="minor">
+                <a:schemeClr val="tx1"/>
+              </a:fontRef>
+            </p:style>
+          </p:cxnSp>
+          <p:cxnSp>
+            <p:nvCxnSpPr>
+              <p:cNvPr id="26" name="Straight Connector 25"/>
+              <p:cNvCxnSpPr/>
+              <p:nvPr/>
+            </p:nvCxnSpPr>
+            <p:spPr>
+              <a:xfrm>
+                <a:off x="4444347" y="6201030"/>
+                <a:ext cx="215213" cy="0"/>
+              </a:xfrm>
+              <a:prstGeom prst="line">
+                <a:avLst/>
+              </a:prstGeom>
+              <a:ln w="28575">
+                <a:solidFill>
+                  <a:schemeClr val="accent6"/>
+                </a:solidFill>
+              </a:ln>
+            </p:spPr>
+            <p:style>
+              <a:lnRef idx="1">
+                <a:schemeClr val="accent1"/>
+              </a:lnRef>
+              <a:fillRef idx="0">
+                <a:schemeClr val="accent1"/>
+              </a:fillRef>
+              <a:effectRef idx="0">
+                <a:schemeClr val="accent1"/>
+              </a:effectRef>
+              <a:fontRef idx="minor">
+                <a:schemeClr val="tx1"/>
+              </a:fontRef>
+            </p:style>
+          </p:cxnSp>
+        </p:grpSp>
+        <p:grpSp>
+          <p:nvGrpSpPr>
+            <p:cNvPr id="27" name="Group 26"/>
+            <p:cNvGrpSpPr/>
+            <p:nvPr/>
+          </p:nvGrpSpPr>
+          <p:grpSpPr>
+            <a:xfrm flipH="1">
+              <a:off x="7593819" y="4043519"/>
+              <a:ext cx="215213" cy="226540"/>
+              <a:chOff x="4444347" y="5974490"/>
+              <a:chExt cx="215213" cy="226540"/>
+            </a:xfrm>
+          </p:grpSpPr>
+          <p:cxnSp>
+            <p:nvCxnSpPr>
+              <p:cNvPr id="28" name="Straight Connector 27"/>
+              <p:cNvCxnSpPr/>
+              <p:nvPr/>
+            </p:nvCxnSpPr>
+            <p:spPr>
+              <a:xfrm>
+                <a:off x="4448123" y="5974490"/>
+                <a:ext cx="0" cy="222764"/>
+              </a:xfrm>
+              <a:prstGeom prst="line">
+                <a:avLst/>
+              </a:prstGeom>
+              <a:ln w="28575">
+                <a:solidFill>
+                  <a:srgbClr val="FF0000"/>
+                </a:solidFill>
+              </a:ln>
+            </p:spPr>
+            <p:style>
+              <a:lnRef idx="1">
+                <a:schemeClr val="accent1"/>
+              </a:lnRef>
+              <a:fillRef idx="0">
+                <a:schemeClr val="accent1"/>
+              </a:fillRef>
+              <a:effectRef idx="0">
+                <a:schemeClr val="accent1"/>
+              </a:effectRef>
+              <a:fontRef idx="minor">
+                <a:schemeClr val="tx1"/>
+              </a:fontRef>
+            </p:style>
+          </p:cxnSp>
+          <p:cxnSp>
+            <p:nvCxnSpPr>
+              <p:cNvPr id="29" name="Straight Connector 28"/>
+              <p:cNvCxnSpPr/>
+              <p:nvPr/>
+            </p:nvCxnSpPr>
+            <p:spPr>
+              <a:xfrm>
+                <a:off x="4444347" y="6201030"/>
+                <a:ext cx="215213" cy="0"/>
+              </a:xfrm>
+              <a:prstGeom prst="line">
+                <a:avLst/>
+              </a:prstGeom>
+              <a:ln w="28575">
+                <a:solidFill>
+                  <a:schemeClr val="accent6"/>
+                </a:solidFill>
+              </a:ln>
+            </p:spPr>
+            <p:style>
+              <a:lnRef idx="1">
+                <a:schemeClr val="accent1"/>
+              </a:lnRef>
+              <a:fillRef idx="0">
+                <a:schemeClr val="accent1"/>
+              </a:fillRef>
+              <a:effectRef idx="0">
+                <a:schemeClr val="accent1"/>
+              </a:effectRef>
+              <a:fontRef idx="minor">
+                <a:schemeClr val="tx1"/>
+              </a:fontRef>
+            </p:style>
+          </p:cxnSp>
+        </p:grpSp>
+        <p:grpSp>
+          <p:nvGrpSpPr>
+            <p:cNvPr id="30" name="Group 29"/>
+            <p:cNvGrpSpPr/>
+            <p:nvPr/>
+          </p:nvGrpSpPr>
+          <p:grpSpPr>
+            <a:xfrm flipH="1">
+              <a:off x="7542201" y="1892880"/>
+              <a:ext cx="215213" cy="226540"/>
+              <a:chOff x="4444347" y="5974490"/>
+              <a:chExt cx="215213" cy="226540"/>
+            </a:xfrm>
+          </p:grpSpPr>
+          <p:cxnSp>
+            <p:nvCxnSpPr>
+              <p:cNvPr id="31" name="Straight Connector 30"/>
+              <p:cNvCxnSpPr/>
+              <p:nvPr/>
+            </p:nvCxnSpPr>
+            <p:spPr>
+              <a:xfrm>
+                <a:off x="4448123" y="5974490"/>
+                <a:ext cx="0" cy="222764"/>
+              </a:xfrm>
+              <a:prstGeom prst="line">
+                <a:avLst/>
+              </a:prstGeom>
+              <a:ln w="28575">
+                <a:solidFill>
+                  <a:srgbClr val="FF0000"/>
+                </a:solidFill>
+              </a:ln>
+            </p:spPr>
+            <p:style>
+              <a:lnRef idx="1">
+                <a:schemeClr val="accent1"/>
+              </a:lnRef>
+              <a:fillRef idx="0">
+                <a:schemeClr val="accent1"/>
+              </a:fillRef>
+              <a:effectRef idx="0">
+                <a:schemeClr val="accent1"/>
+              </a:effectRef>
+              <a:fontRef idx="minor">
+                <a:schemeClr val="tx1"/>
+              </a:fontRef>
+            </p:style>
+          </p:cxnSp>
+          <p:cxnSp>
+            <p:nvCxnSpPr>
+              <p:cNvPr id="32" name="Straight Connector 31"/>
+              <p:cNvCxnSpPr/>
+              <p:nvPr/>
+            </p:nvCxnSpPr>
+            <p:spPr>
+              <a:xfrm>
+                <a:off x="4444347" y="6201030"/>
+                <a:ext cx="215213" cy="0"/>
+              </a:xfrm>
+              <a:prstGeom prst="line">
+                <a:avLst/>
+              </a:prstGeom>
+              <a:ln w="28575">
+                <a:solidFill>
+                  <a:schemeClr val="accent6"/>
+                </a:solidFill>
+              </a:ln>
+            </p:spPr>
+            <p:style>
+              <a:lnRef idx="1">
+                <a:schemeClr val="accent1"/>
+              </a:lnRef>
+              <a:fillRef idx="0">
+                <a:schemeClr val="accent1"/>
+              </a:fillRef>
+              <a:effectRef idx="0">
+                <a:schemeClr val="accent1"/>
+              </a:effectRef>
+              <a:fontRef idx="minor">
+                <a:schemeClr val="tx1"/>
+              </a:fontRef>
+            </p:style>
+          </p:cxnSp>
+        </p:grpSp>
+        <p:grpSp>
+          <p:nvGrpSpPr>
+            <p:cNvPr id="33" name="Group 32"/>
+            <p:cNvGrpSpPr/>
+            <p:nvPr/>
+          </p:nvGrpSpPr>
+          <p:grpSpPr>
+            <a:xfrm>
+              <a:off x="4540929" y="1888219"/>
+              <a:ext cx="215213" cy="226540"/>
+              <a:chOff x="6157784" y="5960076"/>
+              <a:chExt cx="469557" cy="494270"/>
+            </a:xfrm>
+          </p:grpSpPr>
+          <p:cxnSp>
+            <p:nvCxnSpPr>
+              <p:cNvPr id="34" name="Straight Connector 33"/>
+              <p:cNvCxnSpPr/>
+              <p:nvPr/>
+            </p:nvCxnSpPr>
+            <p:spPr>
+              <a:xfrm>
+                <a:off x="6166022" y="5960076"/>
+                <a:ext cx="0" cy="486032"/>
+              </a:xfrm>
+              <a:prstGeom prst="line">
+                <a:avLst/>
+              </a:prstGeom>
+              <a:ln w="28575">
+                <a:solidFill>
+                  <a:srgbClr val="FF0000"/>
+                </a:solidFill>
+              </a:ln>
+            </p:spPr>
+            <p:style>
+              <a:lnRef idx="1">
+                <a:schemeClr val="accent1"/>
+              </a:lnRef>
+              <a:fillRef idx="0">
+                <a:schemeClr val="accent1"/>
+              </a:fillRef>
+              <a:effectRef idx="0">
+                <a:schemeClr val="accent1"/>
+              </a:effectRef>
+              <a:fontRef idx="minor">
+                <a:schemeClr val="tx1"/>
+              </a:fontRef>
+            </p:style>
+          </p:cxnSp>
+          <p:cxnSp>
+            <p:nvCxnSpPr>
+              <p:cNvPr id="35" name="Straight Connector 34"/>
+              <p:cNvCxnSpPr/>
+              <p:nvPr/>
+            </p:nvCxnSpPr>
+            <p:spPr>
+              <a:xfrm>
+                <a:off x="6157784" y="6454346"/>
+                <a:ext cx="469557" cy="0"/>
+              </a:xfrm>
+              <a:prstGeom prst="line">
+                <a:avLst/>
+              </a:prstGeom>
+              <a:ln w="28575">
+                <a:solidFill>
+                  <a:schemeClr val="accent1">
+                    <a:lumMod val="75000"/>
+                  </a:schemeClr>
+                </a:solidFill>
+              </a:ln>
+            </p:spPr>
+            <p:style>
+              <a:lnRef idx="1">
+                <a:schemeClr val="accent1"/>
+              </a:lnRef>
+              <a:fillRef idx="0">
+                <a:schemeClr val="accent1"/>
+              </a:fillRef>
+              <a:effectRef idx="0">
+                <a:schemeClr val="accent1"/>
+              </a:effectRef>
+              <a:fontRef idx="minor">
+                <a:schemeClr val="tx1"/>
+              </a:fontRef>
+            </p:style>
+          </p:cxnSp>
+        </p:grpSp>
+        <p:grpSp>
+          <p:nvGrpSpPr>
+            <p:cNvPr id="36" name="Group 35"/>
+            <p:cNvGrpSpPr/>
+            <p:nvPr/>
+          </p:nvGrpSpPr>
+          <p:grpSpPr>
+            <a:xfrm>
+              <a:off x="5382177" y="2221257"/>
+              <a:ext cx="215213" cy="226540"/>
+              <a:chOff x="6157784" y="5960076"/>
+              <a:chExt cx="469557" cy="494270"/>
+            </a:xfrm>
+          </p:grpSpPr>
+          <p:cxnSp>
+            <p:nvCxnSpPr>
+              <p:cNvPr id="37" name="Straight Connector 36"/>
+              <p:cNvCxnSpPr/>
+              <p:nvPr/>
+            </p:nvCxnSpPr>
+            <p:spPr>
+              <a:xfrm>
+                <a:off x="6166022" y="5960076"/>
+                <a:ext cx="0" cy="486032"/>
+              </a:xfrm>
+              <a:prstGeom prst="line">
+                <a:avLst/>
+              </a:prstGeom>
+              <a:ln w="28575">
+                <a:solidFill>
+                  <a:srgbClr val="FF0000"/>
+                </a:solidFill>
+              </a:ln>
+            </p:spPr>
+            <p:style>
+              <a:lnRef idx="1">
+                <a:schemeClr val="accent1"/>
+              </a:lnRef>
+              <a:fillRef idx="0">
+                <a:schemeClr val="accent1"/>
+              </a:fillRef>
+              <a:effectRef idx="0">
+                <a:schemeClr val="accent1"/>
+              </a:effectRef>
+              <a:fontRef idx="minor">
+                <a:schemeClr val="tx1"/>
+              </a:fontRef>
+            </p:style>
+          </p:cxnSp>
+          <p:cxnSp>
+            <p:nvCxnSpPr>
+              <p:cNvPr id="38" name="Straight Connector 37"/>
+              <p:cNvCxnSpPr/>
+              <p:nvPr/>
+            </p:nvCxnSpPr>
+            <p:spPr>
+              <a:xfrm>
+                <a:off x="6157784" y="6454346"/>
+                <a:ext cx="469557" cy="0"/>
+              </a:xfrm>
+              <a:prstGeom prst="line">
+                <a:avLst/>
+              </a:prstGeom>
+              <a:ln w="28575">
+                <a:solidFill>
+                  <a:schemeClr val="accent1">
+                    <a:lumMod val="75000"/>
+                  </a:schemeClr>
+                </a:solidFill>
+              </a:ln>
+            </p:spPr>
+            <p:style>
+              <a:lnRef idx="1">
+                <a:schemeClr val="accent1"/>
+              </a:lnRef>
+              <a:fillRef idx="0">
+                <a:schemeClr val="accent1"/>
+              </a:fillRef>
+              <a:effectRef idx="0">
+                <a:schemeClr val="accent1"/>
+              </a:effectRef>
+              <a:fontRef idx="minor">
+                <a:schemeClr val="tx1"/>
+              </a:fontRef>
+            </p:style>
+          </p:cxnSp>
+        </p:grpSp>
+        <p:grpSp>
+          <p:nvGrpSpPr>
+            <p:cNvPr id="39" name="Group 38"/>
+            <p:cNvGrpSpPr/>
+            <p:nvPr/>
+          </p:nvGrpSpPr>
+          <p:grpSpPr>
+            <a:xfrm>
+              <a:off x="5382177" y="3185463"/>
+              <a:ext cx="215213" cy="226540"/>
+              <a:chOff x="6157784" y="5960076"/>
+              <a:chExt cx="469557" cy="494270"/>
+            </a:xfrm>
+          </p:grpSpPr>
+          <p:cxnSp>
+            <p:nvCxnSpPr>
+              <p:cNvPr id="40" name="Straight Connector 39"/>
+              <p:cNvCxnSpPr/>
+              <p:nvPr/>
+            </p:nvCxnSpPr>
+            <p:spPr>
+              <a:xfrm>
+                <a:off x="6166022" y="5960076"/>
+                <a:ext cx="0" cy="486032"/>
+              </a:xfrm>
+              <a:prstGeom prst="line">
+                <a:avLst/>
+              </a:prstGeom>
+              <a:ln w="28575">
+                <a:solidFill>
+                  <a:srgbClr val="FF0000"/>
+                </a:solidFill>
+              </a:ln>
+            </p:spPr>
+            <p:style>
+              <a:lnRef idx="1">
+                <a:schemeClr val="accent1"/>
+              </a:lnRef>
+              <a:fillRef idx="0">
+                <a:schemeClr val="accent1"/>
+              </a:fillRef>
+              <a:effectRef idx="0">
+                <a:schemeClr val="accent1"/>
+              </a:effectRef>
+              <a:fontRef idx="minor">
+                <a:schemeClr val="tx1"/>
+              </a:fontRef>
+            </p:style>
+          </p:cxnSp>
+          <p:cxnSp>
+            <p:nvCxnSpPr>
+              <p:cNvPr id="41" name="Straight Connector 40"/>
+              <p:cNvCxnSpPr/>
+              <p:nvPr/>
+            </p:nvCxnSpPr>
+            <p:spPr>
+              <a:xfrm>
+                <a:off x="6157784" y="6454346"/>
+                <a:ext cx="469557" cy="0"/>
+              </a:xfrm>
+              <a:prstGeom prst="line">
+                <a:avLst/>
+              </a:prstGeom>
+              <a:ln w="28575">
+                <a:solidFill>
+                  <a:schemeClr val="accent1">
+                    <a:lumMod val="75000"/>
+                  </a:schemeClr>
+                </a:solidFill>
+              </a:ln>
+            </p:spPr>
+            <p:style>
+              <a:lnRef idx="1">
+                <a:schemeClr val="accent1"/>
+              </a:lnRef>
+              <a:fillRef idx="0">
+                <a:schemeClr val="accent1"/>
+              </a:fillRef>
+              <a:effectRef idx="0">
+                <a:schemeClr val="accent1"/>
+              </a:effectRef>
+              <a:fontRef idx="minor">
+                <a:schemeClr val="tx1"/>
+              </a:fontRef>
+            </p:style>
+          </p:cxnSp>
+        </p:grpSp>
+        <p:grpSp>
+          <p:nvGrpSpPr>
+            <p:cNvPr id="42" name="Group 41"/>
+            <p:cNvGrpSpPr/>
+            <p:nvPr/>
+          </p:nvGrpSpPr>
+          <p:grpSpPr>
+            <a:xfrm>
+              <a:off x="5382177" y="4043519"/>
+              <a:ext cx="215213" cy="226540"/>
+              <a:chOff x="6157784" y="5960076"/>
+              <a:chExt cx="469557" cy="494270"/>
+            </a:xfrm>
+          </p:grpSpPr>
+          <p:cxnSp>
+            <p:nvCxnSpPr>
+              <p:cNvPr id="43" name="Straight Connector 42"/>
+              <p:cNvCxnSpPr/>
+              <p:nvPr/>
+            </p:nvCxnSpPr>
+            <p:spPr>
+              <a:xfrm>
+                <a:off x="6166022" y="5960076"/>
+                <a:ext cx="0" cy="486032"/>
+              </a:xfrm>
+              <a:prstGeom prst="line">
+                <a:avLst/>
+              </a:prstGeom>
+              <a:ln w="28575">
+                <a:solidFill>
+                  <a:srgbClr val="FF0000"/>
+                </a:solidFill>
+              </a:ln>
+            </p:spPr>
+            <p:style>
+              <a:lnRef idx="1">
+                <a:schemeClr val="accent1"/>
+              </a:lnRef>
+              <a:fillRef idx="0">
+                <a:schemeClr val="accent1"/>
+              </a:fillRef>
+              <a:effectRef idx="0">
+                <a:schemeClr val="accent1"/>
+              </a:effectRef>
+              <a:fontRef idx="minor">
+                <a:schemeClr val="tx1"/>
+              </a:fontRef>
+            </p:style>
+          </p:cxnSp>
+          <p:cxnSp>
+            <p:nvCxnSpPr>
+              <p:cNvPr id="44" name="Straight Connector 43"/>
+              <p:cNvCxnSpPr/>
+              <p:nvPr/>
+            </p:nvCxnSpPr>
+            <p:spPr>
+              <a:xfrm>
+                <a:off x="6157784" y="6454346"/>
+                <a:ext cx="469557" cy="0"/>
+              </a:xfrm>
+              <a:prstGeom prst="line">
+                <a:avLst/>
+              </a:prstGeom>
+              <a:ln w="28575">
+                <a:solidFill>
+                  <a:schemeClr val="accent1">
+                    <a:lumMod val="75000"/>
+                  </a:schemeClr>
+                </a:solidFill>
+              </a:ln>
+            </p:spPr>
+            <p:style>
+              <a:lnRef idx="1">
+                <a:schemeClr val="accent1"/>
+              </a:lnRef>
+              <a:fillRef idx="0">
+                <a:schemeClr val="accent1"/>
+              </a:fillRef>
+              <a:effectRef idx="0">
+                <a:schemeClr val="accent1"/>
+              </a:effectRef>
+              <a:fontRef idx="minor">
+                <a:schemeClr val="tx1"/>
+              </a:fontRef>
+            </p:style>
+          </p:cxnSp>
+        </p:grpSp>
+        <p:sp>
+          <p:nvSpPr>
+            <p:cNvPr id="45" name="TextBox 44"/>
+            <p:cNvSpPr txBox="1"/>
+            <p:nvPr/>
+          </p:nvSpPr>
+          <p:spPr>
+            <a:xfrm>
+              <a:off x="5779409" y="1876140"/>
+              <a:ext cx="1458098" cy="261610"/>
+            </a:xfrm>
+            <a:prstGeom prst="rect">
+              <a:avLst/>
+            </a:prstGeom>
+            <a:noFill/>
+          </p:spPr>
+          <p:txBody>
+            <a:bodyPr wrap="square" rtlCol="0">
+              <a:spAutoFit/>
+            </a:bodyPr>
+            <a:lstStyle/>
+            <a:p>
+              <a:pPr algn="ctr"/>
+              <a:r>
+                <a:rPr lang="en-US" sz="1100" dirty="0" err="1" smtClean="0"/>
+                <a:t>head_yaw</a:t>
+              </a:r>
+              <a:endParaRPr lang="en-US" sz="1100" dirty="0"/>
+            </a:p>
+          </p:txBody>
+        </p:sp>
+        <p:sp>
+          <p:nvSpPr>
+            <p:cNvPr id="46" name="TextBox 45"/>
+            <p:cNvSpPr txBox="1"/>
+            <p:nvPr/>
+          </p:nvSpPr>
+          <p:spPr>
+            <a:xfrm>
+              <a:off x="5779409" y="2183566"/>
+              <a:ext cx="1458098" cy="769441"/>
+            </a:xfrm>
+            <a:prstGeom prst="rect">
+              <a:avLst/>
+            </a:prstGeom>
+            <a:noFill/>
+          </p:spPr>
+          <p:txBody>
+            <a:bodyPr wrap="square" rtlCol="0">
+              <a:spAutoFit/>
+            </a:bodyPr>
+            <a:lstStyle/>
+            <a:p>
+              <a:pPr algn="ctr"/>
+              <a:r>
+                <a:rPr lang="en-US" sz="1100" dirty="0" err="1" smtClean="0"/>
+                <a:t>shoulder_pitch</a:t>
+              </a:r>
+              <a:endParaRPr lang="en-US" sz="1100" dirty="0" smtClean="0"/>
+            </a:p>
+            <a:p>
+              <a:pPr algn="ctr"/>
+              <a:r>
+                <a:rPr lang="en-US" sz="1100" dirty="0" err="1" smtClean="0"/>
+                <a:t>shoulder_roll</a:t>
+              </a:r>
+              <a:endParaRPr lang="en-US" sz="1100" dirty="0" smtClean="0"/>
+            </a:p>
+            <a:p>
+              <a:pPr algn="ctr"/>
+              <a:r>
+                <a:rPr lang="en-US" sz="1100" dirty="0" err="1" smtClean="0"/>
+                <a:t>shoulder_yaw</a:t>
+              </a:r>
+              <a:endParaRPr lang="en-US" sz="1100" dirty="0" smtClean="0"/>
+            </a:p>
+            <a:p>
+              <a:pPr algn="ctr"/>
+              <a:r>
+                <a:rPr lang="en-US" sz="1100" dirty="0" smtClean="0"/>
+                <a:t>(co-located)</a:t>
+              </a:r>
+              <a:endParaRPr lang="en-US" sz="1100" dirty="0"/>
+            </a:p>
+          </p:txBody>
+        </p:sp>
+        <p:sp>
+          <p:nvSpPr>
+            <p:cNvPr id="47" name="TextBox 46"/>
+            <p:cNvSpPr txBox="1"/>
+            <p:nvPr/>
+          </p:nvSpPr>
+          <p:spPr>
+            <a:xfrm>
+              <a:off x="3732253" y="5467588"/>
+              <a:ext cx="4306824" cy="215444"/>
+            </a:xfrm>
+            <a:prstGeom prst="rect">
+              <a:avLst/>
+            </a:prstGeom>
+            <a:noFill/>
+          </p:spPr>
+          <p:txBody>
+            <a:bodyPr wrap="square" rtlCol="0">
+              <a:spAutoFit/>
+            </a:bodyPr>
+            <a:lstStyle/>
+            <a:p>
+              <a:pPr algn="ctr"/>
+              <a:r>
+                <a:rPr lang="en-US" sz="800" dirty="0" smtClean="0"/>
+                <a:t>Symmetric joints will be differentiated by a “r_” or “l_” prefix for “right” and “left”</a:t>
+              </a:r>
+              <a:endParaRPr lang="en-US" sz="800" dirty="0"/>
+            </a:p>
+          </p:txBody>
+        </p:sp>
+        <p:sp>
+          <p:nvSpPr>
+            <p:cNvPr id="48" name="TextBox 47"/>
+            <p:cNvSpPr txBox="1"/>
+            <p:nvPr/>
+          </p:nvSpPr>
+          <p:spPr>
+            <a:xfrm>
+              <a:off x="5779409" y="4053913"/>
+              <a:ext cx="1458098" cy="430887"/>
+            </a:xfrm>
+            <a:prstGeom prst="rect">
+              <a:avLst/>
+            </a:prstGeom>
+            <a:noFill/>
+          </p:spPr>
+          <p:txBody>
+            <a:bodyPr wrap="square" rtlCol="0">
+              <a:spAutoFit/>
+            </a:bodyPr>
+            <a:lstStyle/>
+            <a:p>
+              <a:pPr algn="ctr"/>
+              <a:r>
+                <a:rPr lang="en-US" sz="1100" dirty="0" err="1" smtClean="0"/>
+                <a:t>wrist_yaw</a:t>
+              </a:r>
+              <a:endParaRPr lang="en-US" sz="1100" dirty="0" smtClean="0"/>
+            </a:p>
+            <a:p>
+              <a:pPr algn="ctr"/>
+              <a:r>
+                <a:rPr lang="en-US" sz="1100" dirty="0" err="1" smtClean="0"/>
+                <a:t>wrist_roll</a:t>
+              </a:r>
+              <a:endParaRPr lang="en-US" sz="1100" dirty="0"/>
+            </a:p>
+          </p:txBody>
+        </p:sp>
+        <p:sp>
+          <p:nvSpPr>
+            <p:cNvPr id="49" name="TextBox 48"/>
+            <p:cNvSpPr txBox="1"/>
+            <p:nvPr/>
+          </p:nvSpPr>
+          <p:spPr>
+            <a:xfrm>
+              <a:off x="5779409" y="3283266"/>
+              <a:ext cx="1458098" cy="261610"/>
+            </a:xfrm>
+            <a:prstGeom prst="rect">
+              <a:avLst/>
+            </a:prstGeom>
+            <a:noFill/>
+          </p:spPr>
+          <p:txBody>
+            <a:bodyPr wrap="square" rtlCol="0">
+              <a:spAutoFit/>
+            </a:bodyPr>
+            <a:lstStyle/>
+            <a:p>
+              <a:pPr algn="ctr"/>
+              <a:r>
+                <a:rPr lang="en-US" sz="1100" dirty="0" err="1" smtClean="0"/>
+                <a:t>elbow_pitch</a:t>
+              </a:r>
+              <a:endParaRPr lang="en-US" sz="1100" dirty="0"/>
+            </a:p>
+          </p:txBody>
+        </p:sp>
+      </p:grpSp>
+    </p:spTree>
+    <p:extLst>
+      <p:ext uri="{BB962C8B-B14F-4D97-AF65-F5344CB8AC3E}">
+        <p14:creationId xmlns:p14="http://schemas.microsoft.com/office/powerpoint/2010/main" val="2306523520"/>
+      </p:ext>
+    </p:extLst>
+  </p:cSld>
+  <p:clrMapOvr>
+    <a:masterClrMapping/>
+  </p:clrMapOvr>
+</p:sld>
+</file>
+
 <file path=ppt/theme/theme1.xml><?xml version="1.0" encoding="utf-8"?>
 <a:theme xmlns:a="http://schemas.openxmlformats.org/drawingml/2006/main" name="Office Theme">
   <a:themeElements>

</xml_diff>